<commit_message>
Updated with speaker notes.
</commit_message>
<xml_diff>
--- a/docker/01_Basics_of_containers.pptx
+++ b/docker/01_Basics_of_containers.pptx
@@ -5,19 +5,20 @@
     <p:sldMasterId id="2147483733" r:id="rId1"/>
   </p:sldMasterIdLst>
   <p:notesMasterIdLst>
-    <p:notesMasterId r:id="rId9"/>
+    <p:notesMasterId r:id="rId10"/>
   </p:notesMasterIdLst>
   <p:handoutMasterIdLst>
-    <p:handoutMasterId r:id="rId10"/>
+    <p:handoutMasterId r:id="rId11"/>
   </p:handoutMasterIdLst>
   <p:sldIdLst>
     <p:sldId id="435" r:id="rId2"/>
     <p:sldId id="434" r:id="rId3"/>
     <p:sldId id="382" r:id="rId4"/>
     <p:sldId id="436" r:id="rId5"/>
-    <p:sldId id="388" r:id="rId6"/>
+    <p:sldId id="439" r:id="rId6"/>
     <p:sldId id="437" r:id="rId7"/>
-    <p:sldId id="265" r:id="rId8"/>
+    <p:sldId id="388" r:id="rId8"/>
+    <p:sldId id="265" r:id="rId9"/>
   </p:sldIdLst>
   <p:sldSz cx="12195175" cy="6858000"/>
   <p:notesSz cx="6858000" cy="9144000"/>
@@ -193,6 +194,10 @@
 </p:presentation>
 </file>
 
+<file path=ppt/revisionInfo.xml><?xml version="1.0" encoding="utf-8"?>
+<p1510:revInfo xmlns:a="http://schemas.openxmlformats.org/drawingml/2006/main" xmlns:r="http://schemas.openxmlformats.org/officeDocument/2006/relationships" xmlns:p1510="http://schemas.microsoft.com/office/powerpoint/2015/10/main"/>
+</file>
+
 <file path=ppt/handoutMasters/handoutMaster1.xml><?xml version="1.0" encoding="utf-8"?>
 <p:handoutMaster xmlns:a="http://schemas.openxmlformats.org/drawingml/2006/main" xmlns:r="http://schemas.openxmlformats.org/officeDocument/2006/relationships" xmlns:p="http://schemas.openxmlformats.org/presentationml/2006/main">
   <p:cSld>
@@ -566,36 +571,14 @@
           <a:lstStyle/>
           <a:p>
             <a:r>
-              <a:rPr lang="en-US" sz="1400" noProof="0" dirty="0"/>
-              <a:t>Docker extensively uses features of</a:t>
-            </a:r>
-            <a:r>
-              <a:rPr lang="en-US" sz="1400" baseline="0" noProof="0" dirty="0"/>
-              <a:t> the Linux kernel which are listed above. But Docker exists for Windows and Mac, how is that possible?</a:t>
-            </a:r>
-          </a:p>
-          <a:p>
-            <a:r>
-              <a:rPr lang="en-US" sz="1400" baseline="0" noProof="0" dirty="0"/>
-              <a:t>On Windows, Docker uses Hyper-V to silently start a minimalistic Linux VM in the background to run containers. This has some limitations on where you can run Docker for Windows. If your Windows runs within a VM and Docker wants to silently start its minimal Linux VM, you would end up with a VM inside a VM, i.e. </a:t>
-            </a:r>
-            <a:r>
-              <a:rPr lang="en-US" sz="1400" baseline="0" noProof="0"/>
-              <a:t>nested virtualization. </a:t>
-            </a:r>
-            <a:r>
-              <a:rPr lang="en-US" sz="1400" baseline="0" noProof="0" dirty="0"/>
-              <a:t>This is only supported on Windows 10 and Windows 2016. This limitation does not exist for bare-metal setups.</a:t>
-            </a:r>
-          </a:p>
-          <a:p>
-            <a:r>
-              <a:rPr lang="en-US" sz="1400" baseline="0" noProof="0" dirty="0"/>
-              <a:t>Macs use a Virtual Box VM to run a minimal Linux VM that provides the kernel features needed for Docker.</a:t>
-            </a:r>
-          </a:p>
-          <a:p>
-            <a:endParaRPr lang="en-US" sz="1400" baseline="0" noProof="0" dirty="0"/>
+              <a:rPr lang="en-US" dirty="0"/>
+              <a:t>Lots of the attributes of a regular ISO container apply to software </a:t>
+            </a:r>
+            <a:r>
+              <a:rPr lang="en-US"/>
+              <a:t>containers.</a:t>
+            </a:r>
+            <a:endParaRPr lang="en-US" dirty="0"/>
           </a:p>
         </p:txBody>
       </p:sp>
@@ -617,6 +600,315 @@
             <a:fld id="{7D8C2C35-2B8A-446E-BEC0-FD36716C29AC}" type="slidenum">
               <a:rPr lang="de-DE" smtClean="0"/>
               <a:pPr/>
+              <a:t>3</a:t>
+            </a:fld>
+            <a:endParaRPr lang="de-DE" dirty="0"/>
+          </a:p>
+        </p:txBody>
+      </p:sp>
+    </p:spTree>
+    <p:extLst>
+      <p:ext uri="{BB962C8B-B14F-4D97-AF65-F5344CB8AC3E}">
+        <p14:creationId xmlns:p14="http://schemas.microsoft.com/office/powerpoint/2010/main" val="4023966088"/>
+      </p:ext>
+    </p:extLst>
+  </p:cSld>
+  <p:clrMapOvr>
+    <a:masterClrMapping/>
+  </p:clrMapOvr>
+</p:notes>
+</file>
+
+<file path=ppt/notesSlides/notesSlide2.xml><?xml version="1.0" encoding="utf-8"?>
+<p:notes xmlns:a="http://schemas.openxmlformats.org/drawingml/2006/main" xmlns:r="http://schemas.openxmlformats.org/officeDocument/2006/relationships" xmlns:p="http://schemas.openxmlformats.org/presentationml/2006/main">
+  <p:cSld>
+    <p:spTree>
+      <p:nvGrpSpPr>
+        <p:cNvPr id="1" name=""/>
+        <p:cNvGrpSpPr/>
+        <p:nvPr/>
+      </p:nvGrpSpPr>
+      <p:grpSpPr>
+        <a:xfrm>
+          <a:off x="0" y="0"/>
+          <a:ext cx="0" cy="0"/>
+          <a:chOff x="0" y="0"/>
+          <a:chExt cx="0" cy="0"/>
+        </a:xfrm>
+      </p:grpSpPr>
+      <p:sp>
+        <p:nvSpPr>
+          <p:cNvPr id="2" name="Slide Image Placeholder 1"/>
+          <p:cNvSpPr>
+            <a:spLocks noGrp="1" noRot="1" noChangeAspect="1"/>
+          </p:cNvSpPr>
+          <p:nvPr>
+            <p:ph type="sldImg"/>
+          </p:nvPr>
+        </p:nvSpPr>
+        <p:spPr/>
+      </p:sp>
+      <p:sp>
+        <p:nvSpPr>
+          <p:cNvPr id="3" name="Notes Placeholder 2"/>
+          <p:cNvSpPr>
+            <a:spLocks noGrp="1"/>
+          </p:cNvSpPr>
+          <p:nvPr>
+            <p:ph type="body" idx="1"/>
+          </p:nvPr>
+        </p:nvSpPr>
+        <p:spPr/>
+        <p:txBody>
+          <a:bodyPr/>
+          <a:lstStyle/>
+          <a:p>
+            <a:r>
+              <a:rPr lang="en-US" dirty="0"/>
+              <a:t>What are the differences between containers and virtual machines? At first, they look similar – they both offer slicing up a host into isolated environments for applications.</a:t>
+            </a:r>
+          </a:p>
+          <a:p>
+            <a:r>
+              <a:rPr lang="en-US" dirty="0"/>
+              <a:t>Virtual machines need a Hypervisor which provides virtual hardware on which a regular operating system runs with your application running on top. Every VM has its own guest OS kernel, its own set of libraries and its own dedicated storage. The disadvantage to the VM landscape in the slide above is that is that you need to take care of all the guest </a:t>
+            </a:r>
+            <a:r>
+              <a:rPr lang="en-US" dirty="0" err="1"/>
+              <a:t>OS’es</a:t>
+            </a:r>
+            <a:r>
+              <a:rPr lang="en-US" dirty="0"/>
+              <a:t> , the VMs need quite a lot of resources for themselves and it requires a fair amount of time to boot them up.</a:t>
+            </a:r>
+          </a:p>
+          <a:p>
+            <a:r>
+              <a:rPr lang="en-US" dirty="0"/>
+              <a:t>Containers run directly on the OS kernel of the host, there is no Hypervisor and no guest OS. The containers are just regular processes that have been isolated from each other and from the host operating system but they all share the same operating system kernel and environment. The advantage is that there is no additional overhead for guest operating systems – containers start up almost instantly and require far less resources that VMs do.</a:t>
+            </a:r>
+          </a:p>
+        </p:txBody>
+      </p:sp>
+      <p:sp>
+        <p:nvSpPr>
+          <p:cNvPr id="4" name="Slide Number Placeholder 3"/>
+          <p:cNvSpPr>
+            <a:spLocks noGrp="1"/>
+          </p:cNvSpPr>
+          <p:nvPr>
+            <p:ph type="sldNum" sz="quarter" idx="10"/>
+          </p:nvPr>
+        </p:nvSpPr>
+        <p:spPr/>
+        <p:txBody>
+          <a:bodyPr/>
+          <a:lstStyle/>
+          <a:p>
+            <a:fld id="{7D8C2C35-2B8A-446E-BEC0-FD36716C29AC}" type="slidenum">
+              <a:rPr lang="de-DE" smtClean="0"/>
+              <a:pPr/>
+              <a:t>4</a:t>
+            </a:fld>
+            <a:endParaRPr lang="de-DE" dirty="0"/>
+          </a:p>
+        </p:txBody>
+      </p:sp>
+    </p:spTree>
+    <p:extLst>
+      <p:ext uri="{BB962C8B-B14F-4D97-AF65-F5344CB8AC3E}">
+        <p14:creationId xmlns:p14="http://schemas.microsoft.com/office/powerpoint/2010/main" val="449160988"/>
+      </p:ext>
+    </p:extLst>
+  </p:cSld>
+  <p:clrMapOvr>
+    <a:masterClrMapping/>
+  </p:clrMapOvr>
+</p:notes>
+</file>
+
+<file path=ppt/notesSlides/notesSlide3.xml><?xml version="1.0" encoding="utf-8"?>
+<p:notes xmlns:a="http://schemas.openxmlformats.org/drawingml/2006/main" xmlns:r="http://schemas.openxmlformats.org/officeDocument/2006/relationships" xmlns:p="http://schemas.openxmlformats.org/presentationml/2006/main">
+  <p:cSld>
+    <p:spTree>
+      <p:nvGrpSpPr>
+        <p:cNvPr id="1" name=""/>
+        <p:cNvGrpSpPr/>
+        <p:nvPr/>
+      </p:nvGrpSpPr>
+      <p:grpSpPr>
+        <a:xfrm>
+          <a:off x="0" y="0"/>
+          <a:ext cx="0" cy="0"/>
+          <a:chOff x="0" y="0"/>
+          <a:chExt cx="0" cy="0"/>
+        </a:xfrm>
+      </p:grpSpPr>
+      <p:sp>
+        <p:nvSpPr>
+          <p:cNvPr id="2" name="Slide Image Placeholder 1"/>
+          <p:cNvSpPr>
+            <a:spLocks noGrp="1" noRot="1" noChangeAspect="1"/>
+          </p:cNvSpPr>
+          <p:nvPr>
+            <p:ph type="sldImg"/>
+          </p:nvPr>
+        </p:nvSpPr>
+        <p:spPr/>
+      </p:sp>
+      <p:sp>
+        <p:nvSpPr>
+          <p:cNvPr id="3" name="Notes Placeholder 2"/>
+          <p:cNvSpPr>
+            <a:spLocks noGrp="1"/>
+          </p:cNvSpPr>
+          <p:nvPr>
+            <p:ph type="body" idx="1"/>
+          </p:nvPr>
+        </p:nvSpPr>
+        <p:spPr/>
+        <p:txBody>
+          <a:bodyPr/>
+          <a:lstStyle/>
+          <a:p>
+            <a:r>
+              <a:rPr lang="en-US" dirty="0"/>
+              <a:t>The Linux kernel does not know about containers at all – for it, containers are nothing more than just regular processes running on the system. They are managed like all other processes by the kernel. </a:t>
+            </a:r>
+          </a:p>
+          <a:p>
+            <a:r>
+              <a:rPr lang="en-US" dirty="0"/>
+              <a:t>The Linux kernel however offers several features that Docker and other container engines leverage to achieve full isolation of processes from each other. These features are outlined on the next slide and will be discussed in detail in “Members of the Docker Universe”.</a:t>
+            </a:r>
+          </a:p>
+        </p:txBody>
+      </p:sp>
+      <p:sp>
+        <p:nvSpPr>
+          <p:cNvPr id="4" name="Slide Number Placeholder 3"/>
+          <p:cNvSpPr>
+            <a:spLocks noGrp="1"/>
+          </p:cNvSpPr>
+          <p:nvPr>
+            <p:ph type="sldNum" sz="quarter" idx="10"/>
+          </p:nvPr>
+        </p:nvSpPr>
+        <p:spPr/>
+        <p:txBody>
+          <a:bodyPr/>
+          <a:lstStyle/>
+          <a:p>
+            <a:fld id="{7D8C2C35-2B8A-446E-BEC0-FD36716C29AC}" type="slidenum">
+              <a:rPr lang="de-DE" smtClean="0"/>
+              <a:pPr/>
+              <a:t>5</a:t>
+            </a:fld>
+            <a:endParaRPr lang="de-DE" dirty="0"/>
+          </a:p>
+        </p:txBody>
+      </p:sp>
+    </p:spTree>
+    <p:extLst>
+      <p:ext uri="{BB962C8B-B14F-4D97-AF65-F5344CB8AC3E}">
+        <p14:creationId xmlns:p14="http://schemas.microsoft.com/office/powerpoint/2010/main" val="3943829532"/>
+      </p:ext>
+    </p:extLst>
+  </p:cSld>
+  <p:clrMapOvr>
+    <a:masterClrMapping/>
+  </p:clrMapOvr>
+</p:notes>
+</file>
+
+<file path=ppt/notesSlides/notesSlide4.xml><?xml version="1.0" encoding="utf-8"?>
+<p:notes xmlns:a="http://schemas.openxmlformats.org/drawingml/2006/main" xmlns:r="http://schemas.openxmlformats.org/officeDocument/2006/relationships" xmlns:p="http://schemas.openxmlformats.org/presentationml/2006/main">
+  <p:cSld>
+    <p:spTree>
+      <p:nvGrpSpPr>
+        <p:cNvPr id="1" name=""/>
+        <p:cNvGrpSpPr/>
+        <p:nvPr/>
+      </p:nvGrpSpPr>
+      <p:grpSpPr>
+        <a:xfrm>
+          <a:off x="0" y="0"/>
+          <a:ext cx="0" cy="0"/>
+          <a:chOff x="0" y="0"/>
+          <a:chExt cx="0" cy="0"/>
+        </a:xfrm>
+      </p:grpSpPr>
+      <p:sp>
+        <p:nvSpPr>
+          <p:cNvPr id="2" name="Slide Image Placeholder 1"/>
+          <p:cNvSpPr>
+            <a:spLocks noGrp="1" noRot="1" noChangeAspect="1"/>
+          </p:cNvSpPr>
+          <p:nvPr>
+            <p:ph type="sldImg"/>
+          </p:nvPr>
+        </p:nvSpPr>
+        <p:spPr/>
+      </p:sp>
+      <p:sp>
+        <p:nvSpPr>
+          <p:cNvPr id="3" name="Notes Placeholder 2"/>
+          <p:cNvSpPr>
+            <a:spLocks noGrp="1"/>
+          </p:cNvSpPr>
+          <p:nvPr>
+            <p:ph type="body" idx="1"/>
+          </p:nvPr>
+        </p:nvSpPr>
+        <p:spPr/>
+        <p:txBody>
+          <a:bodyPr/>
+          <a:lstStyle/>
+          <a:p>
+            <a:r>
+              <a:rPr lang="en-US" sz="1400" noProof="0" dirty="0"/>
+              <a:t>Docker extensively uses features of</a:t>
+            </a:r>
+            <a:r>
+              <a:rPr lang="en-US" sz="1400" baseline="0" noProof="0" dirty="0"/>
+              <a:t> the Linux kernel which are listed above. But Docker exists for Windows and Mac, how is that possible?</a:t>
+            </a:r>
+          </a:p>
+          <a:p>
+            <a:r>
+              <a:rPr lang="en-US" sz="1400" baseline="0" noProof="0" dirty="0"/>
+              <a:t>On Windows, Docker uses Hyper-V to silently start a minimalistic Linux VM in the background to run containers. This has some limitations on where you can run Docker for Windows. If your Windows runs within a VM and Docker wants to silently start its minimal Linux VM, you would end up with a VM inside a VM, i.e. nested virtualization. This is only supported on Windows 10 and Windows 2016. This limitation does not exist for bare-metal setups.</a:t>
+            </a:r>
+          </a:p>
+          <a:p>
+            <a:r>
+              <a:rPr lang="en-US" sz="1400" baseline="0" noProof="0" dirty="0"/>
+              <a:t>Macs use a Hyperkit VM (https://github.com/moby/hyperkit) to run a minimal Linux VM that provides the kernel features needed for Docker.</a:t>
+            </a:r>
+          </a:p>
+          <a:p>
+            <a:endParaRPr lang="en-US" sz="1400" baseline="0" noProof="0" dirty="0"/>
+          </a:p>
+        </p:txBody>
+      </p:sp>
+      <p:sp>
+        <p:nvSpPr>
+          <p:cNvPr id="4" name="Slide Number Placeholder 3"/>
+          <p:cNvSpPr>
+            <a:spLocks noGrp="1"/>
+          </p:cNvSpPr>
+          <p:nvPr>
+            <p:ph type="sldNum" sz="quarter" idx="10"/>
+          </p:nvPr>
+        </p:nvSpPr>
+        <p:spPr/>
+        <p:txBody>
+          <a:bodyPr/>
+          <a:lstStyle/>
+          <a:p>
+            <a:fld id="{7D8C2C35-2B8A-446E-BEC0-FD36716C29AC}" type="slidenum">
+              <a:rPr lang="de-DE" smtClean="0"/>
+              <a:pPr/>
               <a:t>6</a:t>
             </a:fld>
             <a:endParaRPr lang="de-DE" dirty="0"/>
@@ -636,7 +928,7 @@
 </p:notes>
 </file>
 
-<file path=ppt/notesSlides/notesSlide2.xml><?xml version="1.0" encoding="utf-8"?>
+<file path=ppt/notesSlides/notesSlide5.xml><?xml version="1.0" encoding="utf-8"?>
 <p:notes xmlns:a="http://schemas.openxmlformats.org/drawingml/2006/main" xmlns:r="http://schemas.openxmlformats.org/officeDocument/2006/relationships" xmlns:p="http://schemas.openxmlformats.org/presentationml/2006/main">
   <p:cSld>
     <p:spTree>
@@ -671,7 +963,7 @@
             <a:fld id="{7D8C2C35-2B8A-446E-BEC0-FD36716C29AC}" type="slidenum">
               <a:rPr lang="de-DE" smtClean="0"/>
               <a:pPr/>
-              <a:t>7</a:t>
+              <a:t>8</a:t>
             </a:fld>
             <a:endParaRPr lang="de-DE" dirty="0"/>
           </a:p>
@@ -8683,11 +8975,11 @@
           <p:nvPr/>
         </p:nvPicPr>
         <p:blipFill>
-          <a:blip r:embed="rId2">
+          <a:blip r:embed="rId3">
             <a:extLst>
               <a:ext uri="{BEBA8EAE-BF5A-486C-A8C5-ECC9F3942E4B}">
                 <a14:imgProps xmlns:a14="http://schemas.microsoft.com/office/drawing/2010/main">
-                  <a14:imgLayer r:embed="rId3">
+                  <a14:imgLayer r:embed="rId4">
                     <a14:imgEffect>
                       <a14:backgroundRemoval t="0" b="100000" l="0" r="100000">
                         <a14:foregroundMark x1="9245" y1="9424" x2="9245" y2="9424"/>
@@ -12357,276 +12649,234 @@
       </p:grpSpPr>
       <p:sp>
         <p:nvSpPr>
-          <p:cNvPr id="11" name="Text Placeholder 10"/>
-          <p:cNvSpPr>
-            <a:spLocks noGrp="1"/>
+          <p:cNvPr id="4" name="Divider">
+            <a:extLst>
+              <a:ext uri="{FF2B5EF4-FFF2-40B4-BE49-F238E27FC236}">
+                <a16:creationId xmlns:a16="http://schemas.microsoft.com/office/drawing/2014/main" id="{84DA3F40-8D24-429C-95A2-B212431F9297}"/>
+              </a:ext>
+            </a:extLst>
+          </p:cNvPr>
+          <p:cNvSpPr txBox="1">
+            <a:spLocks/>
           </p:cNvSpPr>
-          <p:nvPr>
-            <p:ph type="body" sz="quarter" idx="10"/>
-          </p:nvPr>
+          <p:nvPr/>
         </p:nvSpPr>
         <p:spPr>
           <a:xfrm>
-            <a:off x="503999" y="1620000"/>
-            <a:ext cx="6091873" cy="4230000"/>
-          </a:xfrm>
-        </p:spPr>
-        <p:txBody>
-          <a:bodyPr/>
-          <a:lstStyle/>
-          <a:p>
-            <a:pPr lvl="1"/>
-            <a:r>
-              <a:rPr lang="en-US" dirty="0"/>
-              <a:t>LXC</a:t>
-            </a:r>
-          </a:p>
-          <a:p>
-            <a:pPr lvl="2"/>
-            <a:r>
-              <a:rPr lang="en-US" dirty="0"/>
-              <a:t>VM Containers in Linux kernel, since 2008</a:t>
-            </a:r>
-          </a:p>
-          <a:p>
-            <a:pPr lvl="2"/>
-            <a:endParaRPr lang="en-US" dirty="0"/>
-          </a:p>
-          <a:p>
-            <a:pPr lvl="1"/>
-            <a:r>
-              <a:rPr lang="en-US" dirty="0"/>
-              <a:t>LXD</a:t>
-            </a:r>
-          </a:p>
-          <a:p>
-            <a:pPr lvl="2"/>
-            <a:r>
-              <a:rPr lang="en-US" dirty="0"/>
-              <a:t>Extension of LCX by Ubuntu, adds a controlling daemon</a:t>
-            </a:r>
-          </a:p>
-          <a:p>
-            <a:pPr lvl="2"/>
-            <a:endParaRPr lang="en-US" dirty="0"/>
-          </a:p>
-          <a:p>
-            <a:pPr lvl="1"/>
-            <a:r>
-              <a:rPr lang="en-US" dirty="0"/>
-              <a:t>Docker</a:t>
-            </a:r>
-          </a:p>
-          <a:p>
-            <a:pPr lvl="2"/>
-            <a:r>
-              <a:rPr lang="en-US" dirty="0"/>
-              <a:t>That’s what we are talking about, since 2013</a:t>
-            </a:r>
-          </a:p>
-          <a:p>
-            <a:pPr lvl="2"/>
-            <a:endParaRPr lang="en-US" dirty="0"/>
-          </a:p>
-          <a:p>
-            <a:pPr lvl="1"/>
-            <a:r>
-              <a:rPr lang="en-US" dirty="0" err="1"/>
-              <a:t>rkt</a:t>
-            </a:r>
-            <a:r>
-              <a:rPr lang="en-US" dirty="0"/>
-              <a:t> </a:t>
-            </a:r>
-            <a:r>
-              <a:rPr lang="de-DE" sz="1400" dirty="0">
-                <a:solidFill>
-                  <a:schemeClr val="tx2">
-                    <a:lumMod val="75000"/>
-                  </a:schemeClr>
-                </a:solidFill>
-              </a:rPr>
-              <a:t>[ˈr(ɒ)</a:t>
-            </a:r>
-            <a:r>
-              <a:rPr lang="de-DE" sz="1400" dirty="0" err="1">
-                <a:solidFill>
-                  <a:schemeClr val="tx2">
-                    <a:lumMod val="75000"/>
-                  </a:schemeClr>
-                </a:solidFill>
-              </a:rPr>
-              <a:t>kit</a:t>
-            </a:r>
-            <a:r>
-              <a:rPr lang="de-DE" sz="1400" dirty="0">
-                <a:solidFill>
-                  <a:schemeClr val="tx2">
-                    <a:lumMod val="75000"/>
-                  </a:schemeClr>
-                </a:solidFill>
-              </a:rPr>
-              <a:t>]</a:t>
-            </a:r>
-            <a:endParaRPr lang="en-US" sz="1400" dirty="0">
-              <a:solidFill>
-                <a:schemeClr val="tx2">
-                  <a:lumMod val="75000"/>
-                </a:schemeClr>
-              </a:solidFill>
-            </a:endParaRPr>
-          </a:p>
-          <a:p>
-            <a:pPr lvl="2"/>
-            <a:r>
-              <a:rPr lang="en-US" dirty="0"/>
-              <a:t>Container engine by CoreOS to replace Docker</a:t>
-            </a:r>
-          </a:p>
-          <a:p>
-            <a:pPr marL="0" lvl="1" indent="0">
-              <a:buNone/>
-            </a:pPr>
-            <a:endParaRPr lang="en-US" dirty="0"/>
-          </a:p>
-        </p:txBody>
-      </p:sp>
-      <p:sp>
-        <p:nvSpPr>
-          <p:cNvPr id="4" name="Title 3"/>
-          <p:cNvSpPr>
-            <a:spLocks noGrp="1"/>
-          </p:cNvSpPr>
-          <p:nvPr>
-            <p:ph type="title"/>
-          </p:nvPr>
-        </p:nvSpPr>
-        <p:spPr>
-          <a:xfrm>
-            <a:off x="504001" y="504000"/>
-            <a:ext cx="11186476" cy="646331"/>
-          </a:xfrm>
-        </p:spPr>
-        <p:txBody>
-          <a:bodyPr/>
-          <a:lstStyle/>
-          <a:p>
-            <a:r>
-              <a:rPr lang="en-US" dirty="0"/>
-              <a:t>Container engines</a:t>
-            </a:r>
-            <a:br>
-              <a:rPr lang="en-US" dirty="0"/>
-            </a:br>
-            <a:r>
-              <a:rPr lang="en-US" sz="1800" b="0" dirty="0"/>
-              <a:t>There is more than just Docker…</a:t>
-            </a:r>
-          </a:p>
-        </p:txBody>
-      </p:sp>
-      <p:pic>
-        <p:nvPicPr>
-          <p:cNvPr id="3" name="Picture 2"/>
-          <p:cNvPicPr>
-            <a:picLocks noChangeAspect="1"/>
-          </p:cNvPicPr>
-          <p:nvPr/>
-        </p:nvPicPr>
-        <p:blipFill>
-          <a:blip r:embed="rId2"/>
-          <a:stretch>
-            <a:fillRect/>
-          </a:stretch>
-        </p:blipFill>
-        <p:spPr>
-          <a:xfrm>
-            <a:off x="10015068" y="1924807"/>
-            <a:ext cx="1311717" cy="1311717"/>
+            <a:off x="503238" y="2345228"/>
+            <a:ext cx="11187112" cy="1918199"/>
           </a:xfrm>
           <a:prstGeom prst="rect">
             <a:avLst/>
           </a:prstGeom>
         </p:spPr>
-      </p:pic>
-      <p:pic>
-        <p:nvPicPr>
-          <p:cNvPr id="67" name="Picture 66"/>
-          <p:cNvPicPr>
-            <a:picLocks noChangeAspect="1"/>
-          </p:cNvPicPr>
-          <p:nvPr/>
-        </p:nvPicPr>
-        <p:blipFill>
-          <a:blip r:embed="rId3"/>
-          <a:stretch>
-            <a:fillRect/>
-          </a:stretch>
-        </p:blipFill>
-        <p:spPr>
-          <a:xfrm>
-            <a:off x="6916226" y="1413582"/>
-            <a:ext cx="2896569" cy="1559691"/>
-          </a:xfrm>
-          <a:prstGeom prst="rect">
-            <a:avLst/>
-          </a:prstGeom>
-        </p:spPr>
-      </p:pic>
-      <p:pic>
-        <p:nvPicPr>
-          <p:cNvPr id="69" name="Picture 68"/>
-          <p:cNvPicPr>
-            <a:picLocks noChangeAspect="1"/>
-          </p:cNvPicPr>
-          <p:nvPr/>
-        </p:nvPicPr>
-        <p:blipFill>
-          <a:blip r:embed="rId4"/>
-          <a:stretch>
-            <a:fillRect/>
-          </a:stretch>
-        </p:blipFill>
-        <p:spPr>
-          <a:xfrm>
-            <a:off x="10015068" y="4508768"/>
-            <a:ext cx="1098793" cy="1458146"/>
-          </a:xfrm>
-          <a:prstGeom prst="rect">
-            <a:avLst/>
-          </a:prstGeom>
-        </p:spPr>
-      </p:pic>
-      <p:pic>
-        <p:nvPicPr>
-          <p:cNvPr id="71" name="Picture 70"/>
-          <p:cNvPicPr>
-            <a:picLocks noChangeAspect="1"/>
-          </p:cNvPicPr>
-          <p:nvPr/>
-        </p:nvPicPr>
-        <p:blipFill>
-          <a:blip r:embed="rId5">
-            <a:extLst/>
-          </a:blip>
-          <a:stretch>
-            <a:fillRect/>
-          </a:stretch>
-        </p:blipFill>
-        <p:spPr>
-          <a:xfrm>
-            <a:off x="7912608" y="3236524"/>
-            <a:ext cx="1957785" cy="1166190"/>
-          </a:xfrm>
-          <a:prstGeom prst="rect">
-            <a:avLst/>
-          </a:prstGeom>
-        </p:spPr>
-      </p:pic>
+        <p:txBody>
+          <a:bodyPr/>
+          <a:lstStyle>
+            <a:lvl1pPr marL="0" indent="0" algn="l" defTabSz="1088558" rtl="0" eaLnBrk="1" latinLnBrk="0" hangingPunct="1">
+              <a:spcBef>
+                <a:spcPts val="1800"/>
+              </a:spcBef>
+              <a:buClr>
+                <a:schemeClr val="accent1"/>
+              </a:buClr>
+              <a:buSzPct val="80000"/>
+              <a:buFontTx/>
+              <a:buNone/>
+              <a:defRPr sz="2000" b="0" kern="1200">
+                <a:solidFill>
+                  <a:schemeClr val="tx1"/>
+                </a:solidFill>
+                <a:latin typeface="+mn-lt"/>
+                <a:ea typeface="+mn-ea"/>
+                <a:cs typeface="+mn-cs"/>
+              </a:defRPr>
+            </a:lvl1pPr>
+            <a:lvl2pPr marL="179964" indent="-179964" algn="l" defTabSz="1088558" rtl="0" eaLnBrk="1" latinLnBrk="0" hangingPunct="1">
+              <a:spcBef>
+                <a:spcPts val="600"/>
+              </a:spcBef>
+              <a:buClr>
+                <a:schemeClr val="accent1"/>
+              </a:buClr>
+              <a:buSzPct val="100000"/>
+              <a:buFont typeface="Wingdings" pitchFamily="2" charset="2"/>
+              <a:buChar char="§"/>
+              <a:defRPr sz="1800" kern="1200">
+                <a:solidFill>
+                  <a:schemeClr val="tx1"/>
+                </a:solidFill>
+                <a:latin typeface="+mn-lt"/>
+                <a:ea typeface="+mn-ea"/>
+                <a:cs typeface="+mn-cs"/>
+              </a:defRPr>
+            </a:lvl2pPr>
+            <a:lvl3pPr marL="358775" indent="-179388" algn="l" defTabSz="1088558" rtl="0" eaLnBrk="1" latinLnBrk="0" hangingPunct="1">
+              <a:spcBef>
+                <a:spcPts val="300"/>
+              </a:spcBef>
+              <a:buClr>
+                <a:schemeClr val="tx1"/>
+              </a:buClr>
+              <a:buSzPct val="100000"/>
+              <a:buFont typeface="Arial" panose="020B0604020202020204" pitchFamily="34" charset="0"/>
+              <a:buChar char="–"/>
+              <a:defRPr lang="en-US" sz="1800" kern="1200" noProof="0" dirty="0" smtClean="0">
+                <a:solidFill>
+                  <a:schemeClr val="tx1"/>
+                </a:solidFill>
+                <a:latin typeface="+mn-lt"/>
+                <a:ea typeface="+mn-ea"/>
+                <a:cs typeface="+mn-cs"/>
+              </a:defRPr>
+            </a:lvl3pPr>
+            <a:lvl4pPr marL="539892" indent="-179964" algn="l" defTabSz="1088558" rtl="0" eaLnBrk="1" latinLnBrk="0" hangingPunct="1">
+              <a:spcBef>
+                <a:spcPts val="300"/>
+              </a:spcBef>
+              <a:buClr>
+                <a:schemeClr val="tx1"/>
+              </a:buClr>
+              <a:buSzPct val="120000"/>
+              <a:buFont typeface="Arial" pitchFamily="34" charset="0"/>
+              <a:buChar char="▫"/>
+              <a:defRPr sz="1600" kern="1200">
+                <a:solidFill>
+                  <a:schemeClr val="tx1"/>
+                </a:solidFill>
+                <a:latin typeface="+mn-lt"/>
+                <a:ea typeface="+mn-ea"/>
+                <a:cs typeface="+mn-cs"/>
+              </a:defRPr>
+            </a:lvl4pPr>
+            <a:lvl5pPr marL="719856" indent="-179964" algn="l" defTabSz="1088558" rtl="0" eaLnBrk="1" latinLnBrk="0" hangingPunct="1">
+              <a:spcBef>
+                <a:spcPts val="100"/>
+              </a:spcBef>
+              <a:buClr>
+                <a:schemeClr val="tx1"/>
+              </a:buClr>
+              <a:buSzPct val="100000"/>
+              <a:buFont typeface="Symbol" panose="05050102010706020507" pitchFamily="18" charset="2"/>
+              <a:buChar char="-"/>
+              <a:defRPr sz="1400" kern="1200" baseline="0">
+                <a:solidFill>
+                  <a:schemeClr val="tx1"/>
+                </a:solidFill>
+                <a:latin typeface="+mn-lt"/>
+                <a:ea typeface="+mn-ea"/>
+                <a:cs typeface="+mn-cs"/>
+              </a:defRPr>
+            </a:lvl5pPr>
+            <a:lvl6pPr marL="2993535" indent="-272140" algn="l" defTabSz="1088558" rtl="0" eaLnBrk="1" latinLnBrk="0" hangingPunct="1">
+              <a:spcBef>
+                <a:spcPct val="20000"/>
+              </a:spcBef>
+              <a:buFont typeface="Arial" pitchFamily="34" charset="0"/>
+              <a:buChar char="•"/>
+              <a:defRPr sz="2400" kern="1200">
+                <a:solidFill>
+                  <a:schemeClr val="tx1"/>
+                </a:solidFill>
+                <a:latin typeface="+mn-lt"/>
+                <a:ea typeface="+mn-ea"/>
+                <a:cs typeface="+mn-cs"/>
+              </a:defRPr>
+            </a:lvl6pPr>
+            <a:lvl7pPr marL="3537814" indent="-272140" algn="l" defTabSz="1088558" rtl="0" eaLnBrk="1" latinLnBrk="0" hangingPunct="1">
+              <a:spcBef>
+                <a:spcPct val="20000"/>
+              </a:spcBef>
+              <a:buFont typeface="Arial" pitchFamily="34" charset="0"/>
+              <a:buChar char="•"/>
+              <a:defRPr sz="2400" kern="1200">
+                <a:solidFill>
+                  <a:schemeClr val="tx1"/>
+                </a:solidFill>
+                <a:latin typeface="+mn-lt"/>
+                <a:ea typeface="+mn-ea"/>
+                <a:cs typeface="+mn-cs"/>
+              </a:defRPr>
+            </a:lvl7pPr>
+            <a:lvl8pPr marL="4082093" indent="-272140" algn="l" defTabSz="1088558" rtl="0" eaLnBrk="1" latinLnBrk="0" hangingPunct="1">
+              <a:spcBef>
+                <a:spcPct val="20000"/>
+              </a:spcBef>
+              <a:buFont typeface="Arial" pitchFamily="34" charset="0"/>
+              <a:buChar char="•"/>
+              <a:defRPr sz="2400" kern="1200">
+                <a:solidFill>
+                  <a:schemeClr val="tx1"/>
+                </a:solidFill>
+                <a:latin typeface="+mn-lt"/>
+                <a:ea typeface="+mn-ea"/>
+                <a:cs typeface="+mn-cs"/>
+              </a:defRPr>
+            </a:lvl8pPr>
+            <a:lvl9pPr marL="4626373" indent="-272140" algn="l" defTabSz="1088558" rtl="0" eaLnBrk="1" latinLnBrk="0" hangingPunct="1">
+              <a:spcBef>
+                <a:spcPct val="20000"/>
+              </a:spcBef>
+              <a:buFont typeface="Arial" pitchFamily="34" charset="0"/>
+              <a:buChar char="•"/>
+              <a:defRPr sz="2400" kern="1200">
+                <a:solidFill>
+                  <a:schemeClr val="tx1"/>
+                </a:solidFill>
+                <a:latin typeface="+mn-lt"/>
+                <a:ea typeface="+mn-ea"/>
+                <a:cs typeface="+mn-cs"/>
+              </a:defRPr>
+            </a:lvl9pPr>
+          </a:lstStyle>
+          <a:p>
+            <a:pPr algn="ctr"/>
+            <a:r>
+              <a:rPr lang="en-US" sz="5400" dirty="0">
+                <a:solidFill>
+                  <a:schemeClr val="accent1"/>
+                </a:solidFill>
+                <a:latin typeface="Arial Black" panose="020B0A04020102020204" pitchFamily="34" charset="0"/>
+              </a:rPr>
+              <a:t>A container </a:t>
+            </a:r>
+            <a:r>
+              <a:rPr lang="en-US" sz="5400" dirty="0">
+                <a:latin typeface="Arial Black" panose="020B0A04020102020204" pitchFamily="34" charset="0"/>
+              </a:rPr>
+              <a:t>is just a process</a:t>
+            </a:r>
+            <a:r>
+              <a:rPr lang="en-US" sz="5400" dirty="0">
+                <a:solidFill>
+                  <a:schemeClr val="accent1"/>
+                </a:solidFill>
+                <a:latin typeface="Arial Black" panose="020B0A04020102020204" pitchFamily="34" charset="0"/>
+              </a:rPr>
+              <a:t> </a:t>
+            </a:r>
+            <a:r>
+              <a:rPr lang="en-US" sz="5400" dirty="0">
+                <a:latin typeface="Arial Black" panose="020B0A04020102020204" pitchFamily="34" charset="0"/>
+              </a:rPr>
+              <a:t>bound by </a:t>
+            </a:r>
+            <a:r>
+              <a:rPr lang="en-US" sz="5400" dirty="0">
+                <a:solidFill>
+                  <a:schemeClr val="accent1"/>
+                </a:solidFill>
+                <a:latin typeface="Arial Black" panose="020B0A04020102020204" pitchFamily="34" charset="0"/>
+              </a:rPr>
+              <a:t>Linux Primitives.</a:t>
+            </a:r>
+          </a:p>
+        </p:txBody>
+      </p:sp>
     </p:spTree>
     <p:extLst>
       <p:ext uri="{BB962C8B-B14F-4D97-AF65-F5344CB8AC3E}">
-        <p14:creationId xmlns:p14="http://schemas.microsoft.com/office/powerpoint/2010/main" val="42108366"/>
+        <p14:creationId xmlns:p14="http://schemas.microsoft.com/office/powerpoint/2010/main" val="3396468909"/>
       </p:ext>
     </p:extLst>
   </p:cSld>
@@ -14191,6 +14441,14 @@
               <a:rPr lang="en-US" sz="1600" dirty="0" err="1"/>
               <a:t>AppArmor</a:t>
             </a:r>
+            <a:r>
+              <a:rPr lang="en-US" sz="1600" dirty="0"/>
+              <a:t>/</a:t>
+            </a:r>
+            <a:r>
+              <a:rPr lang="en-US" sz="1600" dirty="0" err="1"/>
+              <a:t>Seccomp</a:t>
+            </a:r>
             <a:endParaRPr lang="en-US" sz="1600" dirty="0"/>
           </a:p>
           <a:p>
@@ -14229,6 +14487,304 @@
 </file>
 
 <file path=ppt/slides/slide7.xml><?xml version="1.0" encoding="utf-8"?>
+<p:sld xmlns:a="http://schemas.openxmlformats.org/drawingml/2006/main" xmlns:r="http://schemas.openxmlformats.org/officeDocument/2006/relationships" xmlns:p="http://schemas.openxmlformats.org/presentationml/2006/main">
+  <p:cSld>
+    <p:spTree>
+      <p:nvGrpSpPr>
+        <p:cNvPr id="1" name=""/>
+        <p:cNvGrpSpPr/>
+        <p:nvPr/>
+      </p:nvGrpSpPr>
+      <p:grpSpPr>
+        <a:xfrm>
+          <a:off x="0" y="0"/>
+          <a:ext cx="0" cy="0"/>
+          <a:chOff x="0" y="0"/>
+          <a:chExt cx="0" cy="0"/>
+        </a:xfrm>
+      </p:grpSpPr>
+      <p:sp>
+        <p:nvSpPr>
+          <p:cNvPr id="11" name="Text Placeholder 10"/>
+          <p:cNvSpPr>
+            <a:spLocks noGrp="1"/>
+          </p:cNvSpPr>
+          <p:nvPr>
+            <p:ph type="body" sz="quarter" idx="10"/>
+          </p:nvPr>
+        </p:nvSpPr>
+        <p:spPr>
+          <a:xfrm>
+            <a:off x="503999" y="1620000"/>
+            <a:ext cx="6091873" cy="4230000"/>
+          </a:xfrm>
+        </p:spPr>
+        <p:txBody>
+          <a:bodyPr/>
+          <a:lstStyle/>
+          <a:p>
+            <a:pPr lvl="1"/>
+            <a:r>
+              <a:rPr lang="en-US" dirty="0"/>
+              <a:t>LXC</a:t>
+            </a:r>
+          </a:p>
+          <a:p>
+            <a:pPr lvl="2"/>
+            <a:r>
+              <a:rPr lang="en-US" dirty="0"/>
+              <a:t>VM Containers in Linux kernel, since 2008</a:t>
+            </a:r>
+          </a:p>
+          <a:p>
+            <a:pPr lvl="2"/>
+            <a:endParaRPr lang="en-US" dirty="0"/>
+          </a:p>
+          <a:p>
+            <a:pPr lvl="1"/>
+            <a:r>
+              <a:rPr lang="en-US" dirty="0"/>
+              <a:t>LXD</a:t>
+            </a:r>
+          </a:p>
+          <a:p>
+            <a:pPr lvl="2"/>
+            <a:r>
+              <a:rPr lang="en-US" dirty="0"/>
+              <a:t>Extension of LCX by Ubuntu, adds a controlling daemon</a:t>
+            </a:r>
+          </a:p>
+          <a:p>
+            <a:pPr lvl="2"/>
+            <a:endParaRPr lang="en-US" dirty="0"/>
+          </a:p>
+          <a:p>
+            <a:pPr lvl="1"/>
+            <a:r>
+              <a:rPr lang="en-US" dirty="0"/>
+              <a:t>Docker</a:t>
+            </a:r>
+          </a:p>
+          <a:p>
+            <a:pPr lvl="2"/>
+            <a:r>
+              <a:rPr lang="en-US" dirty="0"/>
+              <a:t>That’s what we are talking about, since 2013</a:t>
+            </a:r>
+          </a:p>
+          <a:p>
+            <a:pPr lvl="2"/>
+            <a:endParaRPr lang="en-US" dirty="0"/>
+          </a:p>
+          <a:p>
+            <a:pPr lvl="1"/>
+            <a:r>
+              <a:rPr lang="en-US" dirty="0" err="1"/>
+              <a:t>rkt</a:t>
+            </a:r>
+            <a:r>
+              <a:rPr lang="en-US" dirty="0"/>
+              <a:t> </a:t>
+            </a:r>
+            <a:r>
+              <a:rPr lang="de-DE" sz="1400" dirty="0">
+                <a:solidFill>
+                  <a:schemeClr val="tx2">
+                    <a:lumMod val="75000"/>
+                  </a:schemeClr>
+                </a:solidFill>
+              </a:rPr>
+              <a:t>[ˈr(ɒ)</a:t>
+            </a:r>
+            <a:r>
+              <a:rPr lang="de-DE" sz="1400" dirty="0" err="1">
+                <a:solidFill>
+                  <a:schemeClr val="tx2">
+                    <a:lumMod val="75000"/>
+                  </a:schemeClr>
+                </a:solidFill>
+              </a:rPr>
+              <a:t>kit</a:t>
+            </a:r>
+            <a:r>
+              <a:rPr lang="de-DE" sz="1400" dirty="0">
+                <a:solidFill>
+                  <a:schemeClr val="tx2">
+                    <a:lumMod val="75000"/>
+                  </a:schemeClr>
+                </a:solidFill>
+              </a:rPr>
+              <a:t>]</a:t>
+            </a:r>
+            <a:endParaRPr lang="en-US" sz="1400" dirty="0">
+              <a:solidFill>
+                <a:schemeClr val="tx2">
+                  <a:lumMod val="75000"/>
+                </a:schemeClr>
+              </a:solidFill>
+            </a:endParaRPr>
+          </a:p>
+          <a:p>
+            <a:pPr lvl="2"/>
+            <a:r>
+              <a:rPr lang="en-US" dirty="0"/>
+              <a:t>Container engine by CoreOS to replace Docker</a:t>
+            </a:r>
+          </a:p>
+          <a:p>
+            <a:pPr marL="0" lvl="1" indent="0">
+              <a:buNone/>
+            </a:pPr>
+            <a:endParaRPr lang="en-US" dirty="0"/>
+          </a:p>
+        </p:txBody>
+      </p:sp>
+      <p:sp>
+        <p:nvSpPr>
+          <p:cNvPr id="4" name="Title 3"/>
+          <p:cNvSpPr>
+            <a:spLocks noGrp="1"/>
+          </p:cNvSpPr>
+          <p:nvPr>
+            <p:ph type="title"/>
+          </p:nvPr>
+        </p:nvSpPr>
+        <p:spPr>
+          <a:xfrm>
+            <a:off x="504001" y="504000"/>
+            <a:ext cx="11186476" cy="646331"/>
+          </a:xfrm>
+        </p:spPr>
+        <p:txBody>
+          <a:bodyPr/>
+          <a:lstStyle/>
+          <a:p>
+            <a:r>
+              <a:rPr lang="en-US" dirty="0"/>
+              <a:t>Container engines</a:t>
+            </a:r>
+            <a:br>
+              <a:rPr lang="en-US" dirty="0"/>
+            </a:br>
+            <a:r>
+              <a:rPr lang="en-US" sz="1800" b="0" dirty="0"/>
+              <a:t>There is more than just Docker…</a:t>
+            </a:r>
+          </a:p>
+        </p:txBody>
+      </p:sp>
+      <p:pic>
+        <p:nvPicPr>
+          <p:cNvPr id="3" name="Picture 2"/>
+          <p:cNvPicPr>
+            <a:picLocks noChangeAspect="1"/>
+          </p:cNvPicPr>
+          <p:nvPr/>
+        </p:nvPicPr>
+        <p:blipFill>
+          <a:blip r:embed="rId2"/>
+          <a:stretch>
+            <a:fillRect/>
+          </a:stretch>
+        </p:blipFill>
+        <p:spPr>
+          <a:xfrm>
+            <a:off x="10015068" y="1924807"/>
+            <a:ext cx="1311717" cy="1311717"/>
+          </a:xfrm>
+          <a:prstGeom prst="rect">
+            <a:avLst/>
+          </a:prstGeom>
+        </p:spPr>
+      </p:pic>
+      <p:pic>
+        <p:nvPicPr>
+          <p:cNvPr id="67" name="Picture 66"/>
+          <p:cNvPicPr>
+            <a:picLocks noChangeAspect="1"/>
+          </p:cNvPicPr>
+          <p:nvPr/>
+        </p:nvPicPr>
+        <p:blipFill>
+          <a:blip r:embed="rId3"/>
+          <a:stretch>
+            <a:fillRect/>
+          </a:stretch>
+        </p:blipFill>
+        <p:spPr>
+          <a:xfrm>
+            <a:off x="6916226" y="1413582"/>
+            <a:ext cx="2896569" cy="1559691"/>
+          </a:xfrm>
+          <a:prstGeom prst="rect">
+            <a:avLst/>
+          </a:prstGeom>
+        </p:spPr>
+      </p:pic>
+      <p:pic>
+        <p:nvPicPr>
+          <p:cNvPr id="69" name="Picture 68"/>
+          <p:cNvPicPr>
+            <a:picLocks noChangeAspect="1"/>
+          </p:cNvPicPr>
+          <p:nvPr/>
+        </p:nvPicPr>
+        <p:blipFill>
+          <a:blip r:embed="rId4"/>
+          <a:stretch>
+            <a:fillRect/>
+          </a:stretch>
+        </p:blipFill>
+        <p:spPr>
+          <a:xfrm>
+            <a:off x="10015068" y="4508768"/>
+            <a:ext cx="1098793" cy="1458146"/>
+          </a:xfrm>
+          <a:prstGeom prst="rect">
+            <a:avLst/>
+          </a:prstGeom>
+        </p:spPr>
+      </p:pic>
+      <p:pic>
+        <p:nvPicPr>
+          <p:cNvPr id="71" name="Picture 70"/>
+          <p:cNvPicPr>
+            <a:picLocks noChangeAspect="1"/>
+          </p:cNvPicPr>
+          <p:nvPr/>
+        </p:nvPicPr>
+        <p:blipFill>
+          <a:blip r:embed="rId5">
+            <a:extLst/>
+          </a:blip>
+          <a:stretch>
+            <a:fillRect/>
+          </a:stretch>
+        </p:blipFill>
+        <p:spPr>
+          <a:xfrm>
+            <a:off x="7912608" y="3236524"/>
+            <a:ext cx="1957785" cy="1166190"/>
+          </a:xfrm>
+          <a:prstGeom prst="rect">
+            <a:avLst/>
+          </a:prstGeom>
+        </p:spPr>
+      </p:pic>
+    </p:spTree>
+    <p:extLst>
+      <p:ext uri="{BB962C8B-B14F-4D97-AF65-F5344CB8AC3E}">
+        <p14:creationId xmlns:p14="http://schemas.microsoft.com/office/powerpoint/2010/main" val="42108366"/>
+      </p:ext>
+    </p:extLst>
+  </p:cSld>
+  <p:clrMapOvr>
+    <a:masterClrMapping/>
+  </p:clrMapOvr>
+</p:sld>
+</file>
+
+<file path=ppt/slides/slide8.xml><?xml version="1.0" encoding="utf-8"?>
 <p:sld xmlns:a="http://schemas.openxmlformats.org/drawingml/2006/main" xmlns:r="http://schemas.openxmlformats.org/officeDocument/2006/relationships" xmlns:p="http://schemas.openxmlformats.org/presentationml/2006/main" show="0">
   <p:cSld>
     <p:spTree>

</xml_diff>

<commit_message>
Added speaker notes to the slides.
</commit_message>
<xml_diff>
--- a/docker/01_Basics_of_containers.pptx
+++ b/docker/01_Basics_of_containers.pptx
@@ -929,6 +929,119 @@
 </file>
 
 <file path=ppt/notesSlides/notesSlide5.xml><?xml version="1.0" encoding="utf-8"?>
+<p:notes xmlns:a="http://schemas.openxmlformats.org/drawingml/2006/main" xmlns:r="http://schemas.openxmlformats.org/officeDocument/2006/relationships" xmlns:p="http://schemas.openxmlformats.org/presentationml/2006/main">
+  <p:cSld>
+    <p:spTree>
+      <p:nvGrpSpPr>
+        <p:cNvPr id="1" name=""/>
+        <p:cNvGrpSpPr/>
+        <p:nvPr/>
+      </p:nvGrpSpPr>
+      <p:grpSpPr>
+        <a:xfrm>
+          <a:off x="0" y="0"/>
+          <a:ext cx="0" cy="0"/>
+          <a:chOff x="0" y="0"/>
+          <a:chExt cx="0" cy="0"/>
+        </a:xfrm>
+      </p:grpSpPr>
+      <p:sp>
+        <p:nvSpPr>
+          <p:cNvPr id="2" name="Slide Image Placeholder 1"/>
+          <p:cNvSpPr>
+            <a:spLocks noGrp="1" noRot="1" noChangeAspect="1"/>
+          </p:cNvSpPr>
+          <p:nvPr>
+            <p:ph type="sldImg"/>
+          </p:nvPr>
+        </p:nvSpPr>
+        <p:spPr/>
+      </p:sp>
+      <p:sp>
+        <p:nvSpPr>
+          <p:cNvPr id="3" name="Notes Placeholder 2"/>
+          <p:cNvSpPr>
+            <a:spLocks noGrp="1"/>
+          </p:cNvSpPr>
+          <p:nvPr>
+            <p:ph type="body" idx="1"/>
+          </p:nvPr>
+        </p:nvSpPr>
+        <p:spPr/>
+        <p:txBody>
+          <a:bodyPr/>
+          <a:lstStyle/>
+          <a:p>
+            <a:r>
+              <a:rPr lang="en-US" dirty="0"/>
+              <a:t>There are several different container engines that make use of the container features of the Linux kernel.</a:t>
+            </a:r>
+          </a:p>
+          <a:p>
+            <a:r>
+              <a:rPr lang="en-US" dirty="0"/>
+              <a:t>The big player – and the one that SAP is focusing on – is Docker. </a:t>
+            </a:r>
+          </a:p>
+          <a:p>
+            <a:r>
+              <a:rPr lang="en-US" dirty="0"/>
+              <a:t>But there is LXC (this more or less started it all as some kind of lightweight virtualization), LXD (an extension to LXC from Ubuntu) or </a:t>
+            </a:r>
+            <a:r>
+              <a:rPr lang="en-US" dirty="0" err="1"/>
+              <a:t>rkt</a:t>
+            </a:r>
+            <a:r>
+              <a:rPr lang="en-US" dirty="0"/>
+              <a:t> (pronounced “Rocket”) by CoreOS. Since CoreOS was recently acquired by RedHat, we will see which direction </a:t>
+            </a:r>
+            <a:r>
+              <a:rPr lang="en-US"/>
+              <a:t>it will head to…</a:t>
+            </a:r>
+            <a:endParaRPr lang="en-US" dirty="0"/>
+          </a:p>
+        </p:txBody>
+      </p:sp>
+      <p:sp>
+        <p:nvSpPr>
+          <p:cNvPr id="4" name="Slide Number Placeholder 3"/>
+          <p:cNvSpPr>
+            <a:spLocks noGrp="1"/>
+          </p:cNvSpPr>
+          <p:nvPr>
+            <p:ph type="sldNum" sz="quarter" idx="10"/>
+          </p:nvPr>
+        </p:nvSpPr>
+        <p:spPr/>
+        <p:txBody>
+          <a:bodyPr/>
+          <a:lstStyle/>
+          <a:p>
+            <a:fld id="{7D8C2C35-2B8A-446E-BEC0-FD36716C29AC}" type="slidenum">
+              <a:rPr lang="de-DE" smtClean="0"/>
+              <a:pPr/>
+              <a:t>7</a:t>
+            </a:fld>
+            <a:endParaRPr lang="de-DE" dirty="0"/>
+          </a:p>
+        </p:txBody>
+      </p:sp>
+    </p:spTree>
+    <p:extLst>
+      <p:ext uri="{BB962C8B-B14F-4D97-AF65-F5344CB8AC3E}">
+        <p14:creationId xmlns:p14="http://schemas.microsoft.com/office/powerpoint/2010/main" val="2750234449"/>
+      </p:ext>
+    </p:extLst>
+  </p:cSld>
+  <p:clrMapOvr>
+    <a:masterClrMapping/>
+  </p:clrMapOvr>
+</p:notes>
+</file>
+
+<file path=ppt/notesSlides/notesSlide6.xml><?xml version="1.0" encoding="utf-8"?>
 <p:notes xmlns:a="http://schemas.openxmlformats.org/drawingml/2006/main" xmlns:r="http://schemas.openxmlformats.org/officeDocument/2006/relationships" xmlns:p="http://schemas.openxmlformats.org/presentationml/2006/main">
   <p:cSld>
     <p:spTree>
@@ -14682,7 +14795,7 @@
           <p:nvPr/>
         </p:nvPicPr>
         <p:blipFill>
-          <a:blip r:embed="rId2"/>
+          <a:blip r:embed="rId3"/>
           <a:stretch>
             <a:fillRect/>
           </a:stretch>
@@ -14706,7 +14819,7 @@
           <p:nvPr/>
         </p:nvPicPr>
         <p:blipFill>
-          <a:blip r:embed="rId3"/>
+          <a:blip r:embed="rId4"/>
           <a:stretch>
             <a:fillRect/>
           </a:stretch>
@@ -14730,7 +14843,7 @@
           <p:nvPr/>
         </p:nvPicPr>
         <p:blipFill>
-          <a:blip r:embed="rId4"/>
+          <a:blip r:embed="rId5"/>
           <a:stretch>
             <a:fillRect/>
           </a:stretch>
@@ -14754,7 +14867,7 @@
           <p:nvPr/>
         </p:nvPicPr>
         <p:blipFill>
-          <a:blip r:embed="rId5">
+          <a:blip r:embed="rId6">
             <a:extLst/>
           </a:blip>
           <a:stretch>

</xml_diff>

<commit_message>
Completed speaker notes for Chapter 01 and Chapter 02.
</commit_message>
<xml_diff>
--- a/docker/01_Basics_of_containers.pptx
+++ b/docker/01_Basics_of_containers.pptx
@@ -8703,6 +8703,66 @@
           <a:prstGeom prst="rect">
             <a:avLst/>
           </a:prstGeom>
+        </p:spPr>
+      </p:pic>
+      <p:pic>
+        <p:nvPicPr>
+          <p:cNvPr id="5" name="Picture 1" descr="cid:image003.png@01D31CC6.A08B1C50">
+            <a:extLst>
+              <a:ext uri="{FF2B5EF4-FFF2-40B4-BE49-F238E27FC236}">
+                <a16:creationId xmlns:a16="http://schemas.microsoft.com/office/drawing/2014/main" id="{CE860390-F50F-48A8-AA1A-AE0217946FC1}"/>
+              </a:ext>
+            </a:extLst>
+          </p:cNvPr>
+          <p:cNvPicPr>
+            <a:picLocks noChangeAspect="1" noChangeArrowheads="1"/>
+          </p:cNvPicPr>
+          <p:nvPr/>
+        </p:nvPicPr>
+        <p:blipFill>
+          <a:blip r:embed="rId3">
+            <a:extLst>
+              <a:ext uri="{28A0092B-C50C-407E-A947-70E740481C1C}">
+                <a14:useLocalDpi xmlns:a14="http://schemas.microsoft.com/office/drawing/2010/main" val="0"/>
+              </a:ext>
+            </a:extLst>
+          </a:blip>
+          <a:srcRect/>
+          <a:stretch>
+            <a:fillRect/>
+          </a:stretch>
+        </p:blipFill>
+        <p:spPr bwMode="auto">
+          <a:xfrm>
+            <a:off x="10780713" y="5721975"/>
+            <a:ext cx="1414463" cy="1136025"/>
+          </a:xfrm>
+          <a:prstGeom prst="rect">
+            <a:avLst/>
+          </a:prstGeom>
+          <a:noFill/>
+          <a:ln>
+            <a:noFill/>
+          </a:ln>
+          <a:extLst>
+            <a:ext uri="{909E8E84-426E-40DD-AFC4-6F175D3DCCD1}">
+              <a14:hiddenFill xmlns:a14="http://schemas.microsoft.com/office/drawing/2010/main">
+                <a:solidFill>
+                  <a:srgbClr val="FFFFFF"/>
+                </a:solidFill>
+              </a14:hiddenFill>
+            </a:ext>
+            <a:ext uri="{91240B29-F687-4F45-9708-019B960494DF}">
+              <a14:hiddenLine xmlns:a14="http://schemas.microsoft.com/office/drawing/2010/main" w="9525">
+                <a:solidFill>
+                  <a:srgbClr val="000000"/>
+                </a:solidFill>
+                <a:miter lim="800000"/>
+                <a:headEnd/>
+                <a:tailEnd/>
+              </a14:hiddenLine>
+            </a:ext>
+          </a:extLst>
         </p:spPr>
       </p:pic>
     </p:spTree>

</xml_diff>

<commit_message>
Some polishing of the Docker slides.
</commit_message>
<xml_diff>
--- a/docker/01_Basics_of_containers.pptx
+++ b/docker/01_Basics_of_containers.pptx
@@ -5,10 +5,10 @@
     <p:sldMasterId id="2147483733" r:id="rId1"/>
   </p:sldMasterIdLst>
   <p:notesMasterIdLst>
-    <p:notesMasterId r:id="rId10"/>
+    <p:notesMasterId r:id="rId9"/>
   </p:notesMasterIdLst>
   <p:handoutMasterIdLst>
-    <p:handoutMasterId r:id="rId11"/>
+    <p:handoutMasterId r:id="rId10"/>
   </p:handoutMasterIdLst>
   <p:sldIdLst>
     <p:sldId id="435" r:id="rId2"/>
@@ -16,9 +16,8 @@
     <p:sldId id="382" r:id="rId4"/>
     <p:sldId id="436" r:id="rId5"/>
     <p:sldId id="439" r:id="rId6"/>
-    <p:sldId id="437" r:id="rId7"/>
-    <p:sldId id="388" r:id="rId8"/>
-    <p:sldId id="265" r:id="rId9"/>
+    <p:sldId id="388" r:id="rId7"/>
+    <p:sldId id="265" r:id="rId8"/>
   </p:sldIdLst>
   <p:sldSz cx="12195175" cy="6858000"/>
   <p:notesSz cx="6858000" cy="9144000"/>
@@ -870,84 +869,53 @@
           <a:lstStyle/>
           <a:p>
             <a:r>
-              <a:rPr lang="en-US" sz="1400" noProof="0" dirty="0"/>
-              <a:t>Docker extensively uses features of</a:t>
-            </a:r>
-            <a:r>
-              <a:rPr lang="en-US" sz="1400" baseline="0" noProof="0" dirty="0"/>
-              <a:t> the Linux kernel which are listed above. But Docker exists for Windows and Mac, how is that possible?</a:t>
-            </a:r>
-          </a:p>
-          <a:p>
-            <a:r>
-              <a:rPr lang="en-US" sz="1400" baseline="0" noProof="0" dirty="0"/>
-              <a:t>On Windows, Docker uses Hyper-V to silently start a minimalistic Linux VM in the background to run containers. This has some limitations on where you can run Docker for Windows. If your Windows runs within a VM and Docker wants to silently start its minimal Linux VM, you would end up with a VM inside a VM, i.e. nested virtualization. This is only supported on Windows 10 and Windows 2016. This limitation does not exist for bare-metal setups. </a:t>
-            </a:r>
-          </a:p>
-          <a:p>
-            <a:endParaRPr lang="en-US" sz="1400" baseline="0" noProof="0" dirty="0"/>
-          </a:p>
-          <a:p>
-            <a:r>
-              <a:rPr lang="de-DE" sz="1400" baseline="0" noProof="0" dirty="0" err="1"/>
-              <a:t>Another</a:t>
-            </a:r>
-            <a:r>
-              <a:rPr lang="de-DE" sz="1400" baseline="0" noProof="0" dirty="0"/>
-              <a:t> </a:t>
-            </a:r>
-            <a:r>
-              <a:rPr lang="de-DE" sz="1400" baseline="0" noProof="0" dirty="0" err="1"/>
-              <a:t>way</a:t>
-            </a:r>
-            <a:r>
-              <a:rPr lang="de-DE" sz="1400" baseline="0" noProof="0" dirty="0"/>
-              <a:t> </a:t>
-            </a:r>
-            <a:r>
-              <a:rPr lang="de-DE" sz="1400" baseline="0" noProof="0" dirty="0" err="1"/>
-              <a:t>to</a:t>
-            </a:r>
-            <a:r>
-              <a:rPr lang="de-DE" sz="1400" baseline="0" noProof="0" dirty="0"/>
-              <a:t> </a:t>
-            </a:r>
-            <a:r>
-              <a:rPr lang="de-DE" sz="1400" baseline="0" noProof="0" dirty="0" err="1"/>
-              <a:t>use</a:t>
-            </a:r>
-            <a:r>
-              <a:rPr lang="de-DE" sz="1400" baseline="0" noProof="0" dirty="0"/>
-              <a:t> Docker on Windows </a:t>
-            </a:r>
-            <a:r>
-              <a:rPr lang="de-DE" sz="1400" baseline="0" noProof="0" dirty="0" err="1"/>
-              <a:t>is</a:t>
-            </a:r>
-            <a:r>
-              <a:rPr lang="de-DE" sz="1400" baseline="0" noProof="0" dirty="0"/>
-              <a:t> via Oracle </a:t>
-            </a:r>
-            <a:r>
-              <a:rPr lang="de-DE" sz="1400" baseline="0" noProof="0" dirty="0" err="1"/>
-              <a:t>Virtualbox</a:t>
-            </a:r>
-            <a:r>
-              <a:rPr lang="de-DE" sz="1400" baseline="0" noProof="0" dirty="0"/>
+              <a:rPr lang="en-US" dirty="0"/>
+              <a:t>There are several different container engines that make use of the container features of the Linux kernel.</a:t>
+            </a:r>
+          </a:p>
+          <a:p>
+            <a:r>
+              <a:rPr lang="en-US" dirty="0"/>
+              <a:t>The big player – and the one that SAP is focusing on – is Docker</a:t>
+            </a:r>
+            <a:r>
+              <a:rPr lang="en-US"/>
               <a:t>. </a:t>
             </a:r>
           </a:p>
           <a:p>
-            <a:endParaRPr lang="en-US" sz="1400" baseline="0" noProof="0" dirty="0"/>
-          </a:p>
-          <a:p>
-            <a:r>
-              <a:rPr lang="en-US" sz="1400" baseline="0" noProof="0" dirty="0"/>
-              <a:t>Macs use a Hyperkit VM (https://github.com/moby/hyperkit) to run a minimal Linux VM that provides the kernel features needed for Docker.</a:t>
-            </a:r>
-          </a:p>
-          <a:p>
-            <a:endParaRPr lang="en-US" sz="1400" baseline="0" noProof="0" dirty="0"/>
+            <a:endParaRPr lang="en-US" dirty="0"/>
+          </a:p>
+          <a:p>
+            <a:r>
+              <a:rPr lang="en-US" dirty="0"/>
+              <a:t>But there is LXC (this more or less started it all as some kind of lightweight virtualization), LXD (an extension to LXC from Ubuntu) and </a:t>
+            </a:r>
+            <a:r>
+              <a:rPr lang="en-US" dirty="0" err="1"/>
+              <a:t>rkt</a:t>
+            </a:r>
+            <a:r>
+              <a:rPr lang="en-US" dirty="0"/>
+              <a:t> (pronounced “Rocket”) by CoreOS. Since CoreOS was recently acquired by RedHat, we will see which direction it will head to…  </a:t>
+            </a:r>
+          </a:p>
+          <a:p>
+            <a:endParaRPr lang="en-US" dirty="0"/>
+          </a:p>
+          <a:p>
+            <a:r>
+              <a:rPr lang="en-US" dirty="0"/>
+              <a:t>Using docker at this point is safe since it is mainstream and possibly required changes moving to </a:t>
+            </a:r>
+            <a:r>
+              <a:rPr lang="en-US" dirty="0" err="1"/>
+              <a:t>rkt</a:t>
+            </a:r>
+            <a:r>
+              <a:rPr lang="en-US" dirty="0"/>
+              <a:t> should be small.</a:t>
+            </a:r>
           </a:p>
         </p:txBody>
       </p:sp>
@@ -978,7 +946,7 @@
     </p:spTree>
     <p:extLst>
       <p:ext uri="{BB962C8B-B14F-4D97-AF65-F5344CB8AC3E}">
-        <p14:creationId xmlns:p14="http://schemas.microsoft.com/office/powerpoint/2010/main" val="945922821"/>
+        <p14:creationId xmlns:p14="http://schemas.microsoft.com/office/powerpoint/2010/main" val="2750234449"/>
       </p:ext>
     </p:extLst>
   </p:cSld>
@@ -989,138 +957,6 @@
 </file>
 
 <file path=ppt/notesSlides/notesSlide5.xml><?xml version="1.0" encoding="utf-8"?>
-<p:notes xmlns:a="http://schemas.openxmlformats.org/drawingml/2006/main" xmlns:r="http://schemas.openxmlformats.org/officeDocument/2006/relationships" xmlns:p="http://schemas.openxmlformats.org/presentationml/2006/main">
-  <p:cSld>
-    <p:spTree>
-      <p:nvGrpSpPr>
-        <p:cNvPr id="1" name=""/>
-        <p:cNvGrpSpPr/>
-        <p:nvPr/>
-      </p:nvGrpSpPr>
-      <p:grpSpPr>
-        <a:xfrm>
-          <a:off x="0" y="0"/>
-          <a:ext cx="0" cy="0"/>
-          <a:chOff x="0" y="0"/>
-          <a:chExt cx="0" cy="0"/>
-        </a:xfrm>
-      </p:grpSpPr>
-      <p:sp>
-        <p:nvSpPr>
-          <p:cNvPr id="2" name="Slide Image Placeholder 1"/>
-          <p:cNvSpPr>
-            <a:spLocks noGrp="1" noRot="1" noChangeAspect="1"/>
-          </p:cNvSpPr>
-          <p:nvPr>
-            <p:ph type="sldImg"/>
-          </p:nvPr>
-        </p:nvSpPr>
-        <p:spPr/>
-      </p:sp>
-      <p:sp>
-        <p:nvSpPr>
-          <p:cNvPr id="3" name="Notes Placeholder 2"/>
-          <p:cNvSpPr>
-            <a:spLocks noGrp="1"/>
-          </p:cNvSpPr>
-          <p:nvPr>
-            <p:ph type="body" idx="1"/>
-          </p:nvPr>
-        </p:nvSpPr>
-        <p:spPr/>
-        <p:txBody>
-          <a:bodyPr/>
-          <a:lstStyle/>
-          <a:p>
-            <a:r>
-              <a:rPr lang="en-US" dirty="0"/>
-              <a:t>There are several different container engines that make use of the container features of the Linux kernel.</a:t>
-            </a:r>
-          </a:p>
-          <a:p>
-            <a:r>
-              <a:rPr lang="en-US" dirty="0"/>
-              <a:t>The big player – and the one that SAP is focusing on – is Docker</a:t>
-            </a:r>
-            <a:r>
-              <a:rPr lang="en-US"/>
-              <a:t>. </a:t>
-            </a:r>
-          </a:p>
-          <a:p>
-            <a:endParaRPr lang="en-US" dirty="0"/>
-          </a:p>
-          <a:p>
-            <a:r>
-              <a:rPr lang="en-US" dirty="0"/>
-              <a:t>But there is LXC (this more or less started it all as some kind of lightweight virtualization), LXD (an extension to LXC from Ubuntu) and </a:t>
-            </a:r>
-            <a:r>
-              <a:rPr lang="en-US" dirty="0" err="1"/>
-              <a:t>rkt</a:t>
-            </a:r>
-            <a:r>
-              <a:rPr lang="en-US" dirty="0"/>
-              <a:t> (pronounced “Rocket”) by CoreOS. Since CoreOS was recently acquired by RedHat, we will see which direction it will head to…  </a:t>
-            </a:r>
-          </a:p>
-          <a:p>
-            <a:endParaRPr lang="en-US" dirty="0"/>
-          </a:p>
-          <a:p>
-            <a:r>
-              <a:rPr lang="en-US" dirty="0"/>
-              <a:t>Using docker at this point is safe since it is mainstream and possibly required changes moving to </a:t>
-            </a:r>
-            <a:r>
-              <a:rPr lang="en-US" dirty="0" err="1"/>
-              <a:t>rkt</a:t>
-            </a:r>
-            <a:r>
-              <a:rPr lang="en-US" dirty="0"/>
-              <a:t> should be small.</a:t>
-            </a:r>
-          </a:p>
-        </p:txBody>
-      </p:sp>
-      <p:sp>
-        <p:nvSpPr>
-          <p:cNvPr id="4" name="Slide Number Placeholder 3"/>
-          <p:cNvSpPr>
-            <a:spLocks noGrp="1"/>
-          </p:cNvSpPr>
-          <p:nvPr>
-            <p:ph type="sldNum" sz="quarter" idx="10"/>
-          </p:nvPr>
-        </p:nvSpPr>
-        <p:spPr/>
-        <p:txBody>
-          <a:bodyPr/>
-          <a:lstStyle/>
-          <a:p>
-            <a:fld id="{7D8C2C35-2B8A-446E-BEC0-FD36716C29AC}" type="slidenum">
-              <a:rPr lang="de-DE" smtClean="0"/>
-              <a:pPr/>
-              <a:t>7</a:t>
-            </a:fld>
-            <a:endParaRPr lang="de-DE" dirty="0"/>
-          </a:p>
-        </p:txBody>
-      </p:sp>
-    </p:spTree>
-    <p:extLst>
-      <p:ext uri="{BB962C8B-B14F-4D97-AF65-F5344CB8AC3E}">
-        <p14:creationId xmlns:p14="http://schemas.microsoft.com/office/powerpoint/2010/main" val="2750234449"/>
-      </p:ext>
-    </p:extLst>
-  </p:cSld>
-  <p:clrMapOvr>
-    <a:masterClrMapping/>
-  </p:clrMapOvr>
-</p:notes>
-</file>
-
-<file path=ppt/notesSlides/notesSlide6.xml><?xml version="1.0" encoding="utf-8"?>
 <p:notes xmlns:a="http://schemas.openxmlformats.org/drawingml/2006/main" xmlns:r="http://schemas.openxmlformats.org/officeDocument/2006/relationships" xmlns:p="http://schemas.openxmlformats.org/presentationml/2006/main">
   <p:cSld>
     <p:spTree>
@@ -1155,7 +991,7 @@
             <a:fld id="{7D8C2C35-2B8A-446E-BEC0-FD36716C29AC}" type="slidenum">
               <a:rPr lang="de-DE" smtClean="0"/>
               <a:pPr/>
-              <a:t>8</a:t>
+              <a:t>7</a:t>
             </a:fld>
             <a:endParaRPr lang="de-DE" dirty="0"/>
           </a:p>
@@ -13157,1606 +12993,6 @@
       </p:grpSpPr>
       <p:sp>
         <p:nvSpPr>
-          <p:cNvPr id="3" name="Title 2"/>
-          <p:cNvSpPr>
-            <a:spLocks noGrp="1"/>
-          </p:cNvSpPr>
-          <p:nvPr>
-            <p:ph type="title"/>
-          </p:nvPr>
-        </p:nvSpPr>
-        <p:spPr/>
-        <p:txBody>
-          <a:bodyPr/>
-          <a:lstStyle/>
-          <a:p>
-            <a:r>
-              <a:rPr lang="en-US" dirty="0"/>
-              <a:t>Docker technologies</a:t>
-            </a:r>
-          </a:p>
-        </p:txBody>
-      </p:sp>
-      <p:sp>
-        <p:nvSpPr>
-          <p:cNvPr id="5" name="Rectangle 4"/>
-          <p:cNvSpPr/>
-          <p:nvPr/>
-        </p:nvSpPr>
-        <p:spPr bwMode="gray">
-          <a:xfrm>
-            <a:off x="916101" y="3327400"/>
-            <a:ext cx="4426368" cy="2341629"/>
-          </a:xfrm>
-          <a:prstGeom prst="rect">
-            <a:avLst/>
-          </a:prstGeom>
-          <a:solidFill>
-            <a:schemeClr val="tx2">
-              <a:lumMod val="25000"/>
-            </a:schemeClr>
-          </a:solidFill>
-          <a:ln w="6350" algn="ctr">
-            <a:solidFill>
-              <a:schemeClr val="tx1"/>
-            </a:solidFill>
-            <a:miter lim="800000"/>
-            <a:headEnd/>
-            <a:tailEnd/>
-          </a:ln>
-        </p:spPr>
-        <p:txBody>
-          <a:bodyPr lIns="90000" tIns="72000" rIns="90000" bIns="72000" rtlCol="0" anchor="ctr"/>
-          <a:lstStyle/>
-          <a:p>
-            <a:pPr marR="0" algn="ctr" defTabSz="914400" eaLnBrk="1" fontAlgn="base" latinLnBrk="0" hangingPunct="1">
-              <a:lnSpc>
-                <a:spcPct val="100000"/>
-              </a:lnSpc>
-              <a:spcBef>
-                <a:spcPct val="50000"/>
-              </a:spcBef>
-              <a:spcAft>
-                <a:spcPct val="0"/>
-              </a:spcAft>
-              <a:buClr>
-                <a:srgbClr val="F0AB00"/>
-              </a:buClr>
-              <a:buSzPct val="80000"/>
-              <a:tabLst/>
-            </a:pPr>
-            <a:endParaRPr kumimoji="0" lang="en-US" sz="1800" b="0" i="0" u="none" strike="noStrike" kern="0" cap="none" spc="0" normalizeH="0" baseline="0" dirty="0">
-              <a:ln>
-                <a:noFill/>
-              </a:ln>
-              <a:solidFill>
-                <a:schemeClr val="bg1"/>
-              </a:solidFill>
-              <a:effectLst/>
-              <a:uLnTx/>
-              <a:uFillTx/>
-              <a:ea typeface="Arial Unicode MS" pitchFamily="34" charset="-128"/>
-              <a:cs typeface="Arial Unicode MS" pitchFamily="34" charset="-128"/>
-            </a:endParaRPr>
-          </a:p>
-        </p:txBody>
-      </p:sp>
-      <p:sp>
-        <p:nvSpPr>
-          <p:cNvPr id="6" name="Rectangle 5"/>
-          <p:cNvSpPr/>
-          <p:nvPr/>
-        </p:nvSpPr>
-        <p:spPr bwMode="gray">
-          <a:xfrm>
-            <a:off x="994619" y="3395133"/>
-            <a:ext cx="4271648" cy="1787461"/>
-          </a:xfrm>
-          <a:prstGeom prst="rect">
-            <a:avLst/>
-          </a:prstGeom>
-          <a:solidFill>
-            <a:schemeClr val="accent4">
-              <a:lumMod val="75000"/>
-            </a:schemeClr>
-          </a:solidFill>
-          <a:ln w="6350" algn="ctr">
-            <a:solidFill>
-              <a:schemeClr val="tx1"/>
-            </a:solidFill>
-            <a:miter lim="800000"/>
-            <a:headEnd/>
-            <a:tailEnd/>
-          </a:ln>
-        </p:spPr>
-        <p:txBody>
-          <a:bodyPr lIns="90000" tIns="72000" rIns="90000" bIns="72000" rtlCol="0" anchor="t" anchorCtr="0"/>
-          <a:lstStyle/>
-          <a:p>
-            <a:pPr marR="0" algn="ctr" defTabSz="914400" eaLnBrk="1" fontAlgn="base" latinLnBrk="0" hangingPunct="1">
-              <a:lnSpc>
-                <a:spcPct val="100000"/>
-              </a:lnSpc>
-              <a:spcBef>
-                <a:spcPct val="50000"/>
-              </a:spcBef>
-              <a:spcAft>
-                <a:spcPct val="0"/>
-              </a:spcAft>
-              <a:buClr>
-                <a:srgbClr val="F0AB00"/>
-              </a:buClr>
-              <a:buSzPct val="80000"/>
-              <a:tabLst/>
-            </a:pPr>
-            <a:r>
-              <a:rPr kumimoji="0" lang="en-US" sz="1800" b="0" i="0" u="none" strike="noStrike" kern="0" cap="none" spc="0" normalizeH="0" baseline="0" dirty="0">
-                <a:ln>
-                  <a:noFill/>
-                </a:ln>
-                <a:solidFill>
-                  <a:schemeClr val="bg1"/>
-                </a:solidFill>
-                <a:effectLst/>
-                <a:uLnTx/>
-                <a:uFillTx/>
-                <a:ea typeface="Arial Unicode MS" pitchFamily="34" charset="-128"/>
-                <a:cs typeface="Arial Unicode MS" pitchFamily="34" charset="-128"/>
-              </a:rPr>
-              <a:t>Linux</a:t>
-            </a:r>
-          </a:p>
-        </p:txBody>
-      </p:sp>
-      <p:sp>
-        <p:nvSpPr>
-          <p:cNvPr id="7" name="Arrow: Down 6"/>
-          <p:cNvSpPr/>
-          <p:nvPr/>
-        </p:nvSpPr>
-        <p:spPr bwMode="gray">
-          <a:xfrm>
-            <a:off x="1079289" y="3079385"/>
-            <a:ext cx="712104" cy="554913"/>
-          </a:xfrm>
-          <a:prstGeom prst="downArrow">
-            <a:avLst>
-              <a:gd name="adj1" fmla="val 50000"/>
-              <a:gd name="adj2" fmla="val 38537"/>
-            </a:avLst>
-          </a:prstGeom>
-          <a:solidFill>
-            <a:schemeClr val="tx2">
-              <a:lumMod val="50000"/>
-            </a:schemeClr>
-          </a:solidFill>
-          <a:ln w="6350" algn="ctr">
-            <a:solidFill>
-              <a:schemeClr val="tx1"/>
-            </a:solidFill>
-            <a:miter lim="800000"/>
-            <a:headEnd/>
-            <a:tailEnd/>
-          </a:ln>
-        </p:spPr>
-        <p:txBody>
-          <a:bodyPr lIns="90000" tIns="72000" rIns="90000" bIns="72000" rtlCol="0" anchor="ctr"/>
-          <a:lstStyle/>
-          <a:p>
-            <a:pPr marR="0" algn="ctr" defTabSz="914400" eaLnBrk="1" fontAlgn="base" latinLnBrk="0" hangingPunct="1">
-              <a:lnSpc>
-                <a:spcPct val="100000"/>
-              </a:lnSpc>
-              <a:spcBef>
-                <a:spcPct val="50000"/>
-              </a:spcBef>
-              <a:spcAft>
-                <a:spcPct val="0"/>
-              </a:spcAft>
-              <a:buClr>
-                <a:srgbClr val="F0AB00"/>
-              </a:buClr>
-              <a:buSzPct val="80000"/>
-              <a:tabLst/>
-            </a:pPr>
-            <a:endParaRPr kumimoji="0" lang="en-US" sz="1800" b="0" i="0" u="none" strike="noStrike" kern="0" cap="none" spc="0" normalizeH="0" baseline="0" dirty="0">
-              <a:ln>
-                <a:noFill/>
-              </a:ln>
-              <a:solidFill>
-                <a:schemeClr val="bg1"/>
-              </a:solidFill>
-              <a:effectLst/>
-              <a:uLnTx/>
-              <a:uFillTx/>
-              <a:ea typeface="Arial Unicode MS" pitchFamily="34" charset="-128"/>
-              <a:cs typeface="Arial Unicode MS" pitchFamily="34" charset="-128"/>
-            </a:endParaRPr>
-          </a:p>
-        </p:txBody>
-      </p:sp>
-      <p:sp>
-        <p:nvSpPr>
-          <p:cNvPr id="8" name="Arrow: Down 7"/>
-          <p:cNvSpPr/>
-          <p:nvPr/>
-        </p:nvSpPr>
-        <p:spPr bwMode="gray">
-          <a:xfrm>
-            <a:off x="4473888" y="3075040"/>
-            <a:ext cx="712104" cy="554913"/>
-          </a:xfrm>
-          <a:prstGeom prst="downArrow">
-            <a:avLst>
-              <a:gd name="adj1" fmla="val 50000"/>
-              <a:gd name="adj2" fmla="val 38537"/>
-            </a:avLst>
-          </a:prstGeom>
-          <a:solidFill>
-            <a:schemeClr val="tx2">
-              <a:lumMod val="50000"/>
-            </a:schemeClr>
-          </a:solidFill>
-          <a:ln w="6350" algn="ctr">
-            <a:solidFill>
-              <a:schemeClr val="tx1"/>
-            </a:solidFill>
-            <a:miter lim="800000"/>
-            <a:headEnd/>
-            <a:tailEnd/>
-          </a:ln>
-        </p:spPr>
-        <p:txBody>
-          <a:bodyPr lIns="90000" tIns="72000" rIns="90000" bIns="72000" rtlCol="0" anchor="ctr"/>
-          <a:lstStyle/>
-          <a:p>
-            <a:pPr marR="0" algn="ctr" defTabSz="914400" eaLnBrk="1" fontAlgn="base" latinLnBrk="0" hangingPunct="1">
-              <a:lnSpc>
-                <a:spcPct val="100000"/>
-              </a:lnSpc>
-              <a:spcBef>
-                <a:spcPct val="50000"/>
-              </a:spcBef>
-              <a:spcAft>
-                <a:spcPct val="0"/>
-              </a:spcAft>
-              <a:buClr>
-                <a:srgbClr val="F0AB00"/>
-              </a:buClr>
-              <a:buSzPct val="80000"/>
-              <a:tabLst/>
-            </a:pPr>
-            <a:endParaRPr kumimoji="0" lang="en-US" sz="1800" b="0" i="0" u="none" strike="noStrike" kern="0" cap="none" spc="0" normalizeH="0" baseline="0" dirty="0">
-              <a:ln>
-                <a:noFill/>
-              </a:ln>
-              <a:solidFill>
-                <a:schemeClr val="bg1"/>
-              </a:solidFill>
-              <a:effectLst/>
-              <a:uLnTx/>
-              <a:uFillTx/>
-              <a:ea typeface="Arial Unicode MS" pitchFamily="34" charset="-128"/>
-              <a:cs typeface="Arial Unicode MS" pitchFamily="34" charset="-128"/>
-            </a:endParaRPr>
-          </a:p>
-        </p:txBody>
-      </p:sp>
-      <p:grpSp>
-        <p:nvGrpSpPr>
-          <p:cNvPr id="9" name="Group 8"/>
-          <p:cNvGrpSpPr/>
-          <p:nvPr/>
-        </p:nvGrpSpPr>
-        <p:grpSpPr>
-          <a:xfrm>
-            <a:off x="916100" y="2056108"/>
-            <a:ext cx="4426368" cy="1096525"/>
-            <a:chOff x="916099" y="2056108"/>
-            <a:chExt cx="4920343" cy="1096525"/>
-          </a:xfrm>
-        </p:grpSpPr>
-        <p:sp>
-          <p:nvSpPr>
-            <p:cNvPr id="10" name="Rectangle 9"/>
-            <p:cNvSpPr/>
-            <p:nvPr/>
-          </p:nvSpPr>
-          <p:spPr bwMode="gray">
-            <a:xfrm>
-              <a:off x="916099" y="2056108"/>
-              <a:ext cx="4920343" cy="1096525"/>
-            </a:xfrm>
-            <a:prstGeom prst="rect">
-              <a:avLst/>
-            </a:prstGeom>
-            <a:solidFill>
-              <a:schemeClr val="accent2">
-                <a:lumMod val="75000"/>
-              </a:schemeClr>
-            </a:solidFill>
-            <a:ln w="6350" algn="ctr">
-              <a:solidFill>
-                <a:schemeClr val="tx1"/>
-              </a:solidFill>
-              <a:miter lim="800000"/>
-              <a:headEnd/>
-              <a:tailEnd/>
-            </a:ln>
-          </p:spPr>
-          <p:txBody>
-            <a:bodyPr lIns="90000" tIns="72000" rIns="90000" bIns="72000" rtlCol="0" anchor="t" anchorCtr="0"/>
-            <a:lstStyle/>
-            <a:p>
-              <a:pPr marR="0" algn="ctr" defTabSz="914400" eaLnBrk="1" fontAlgn="base" latinLnBrk="0" hangingPunct="1">
-                <a:lnSpc>
-                  <a:spcPct val="100000"/>
-                </a:lnSpc>
-                <a:spcBef>
-                  <a:spcPct val="50000"/>
-                </a:spcBef>
-                <a:spcAft>
-                  <a:spcPct val="0"/>
-                </a:spcAft>
-                <a:buClr>
-                  <a:srgbClr val="F0AB00"/>
-                </a:buClr>
-                <a:buSzPct val="80000"/>
-                <a:tabLst/>
-              </a:pPr>
-              <a:r>
-                <a:rPr kumimoji="0" lang="en-US" sz="1600" b="0" i="0" u="none" strike="noStrike" kern="0" cap="none" spc="0" normalizeH="0" baseline="0" dirty="0">
-                  <a:ln>
-                    <a:noFill/>
-                  </a:ln>
-                  <a:solidFill>
-                    <a:schemeClr val="bg1"/>
-                  </a:solidFill>
-                  <a:effectLst/>
-                  <a:uLnTx/>
-                  <a:uFillTx/>
-                  <a:ea typeface="Arial Unicode MS" pitchFamily="34" charset="-128"/>
-                  <a:cs typeface="Arial Unicode MS" pitchFamily="34" charset="-128"/>
-                </a:rPr>
-                <a:t>Docker Runtime</a:t>
-              </a:r>
-            </a:p>
-          </p:txBody>
-        </p:sp>
-        <p:sp>
-          <p:nvSpPr>
-            <p:cNvPr id="11" name="Rectangle 10"/>
-            <p:cNvSpPr/>
-            <p:nvPr/>
-          </p:nvSpPr>
-          <p:spPr bwMode="gray">
-            <a:xfrm>
-              <a:off x="994619" y="2421820"/>
-              <a:ext cx="774914" cy="668513"/>
-            </a:xfrm>
-            <a:prstGeom prst="rect">
-              <a:avLst/>
-            </a:prstGeom>
-            <a:solidFill>
-              <a:schemeClr val="accent3">
-                <a:lumMod val="50000"/>
-              </a:schemeClr>
-            </a:solidFill>
-            <a:ln w="6350" algn="ctr">
-              <a:solidFill>
-                <a:schemeClr val="tx1"/>
-              </a:solidFill>
-              <a:miter lim="800000"/>
-              <a:headEnd/>
-              <a:tailEnd/>
-            </a:ln>
-          </p:spPr>
-          <p:txBody>
-            <a:bodyPr vert="vert270" lIns="90000" tIns="72000" rIns="90000" bIns="72000" rtlCol="0" anchor="ctr"/>
-            <a:lstStyle/>
-            <a:p>
-              <a:pPr marR="0" algn="ctr" defTabSz="914400" eaLnBrk="1" fontAlgn="base" latinLnBrk="0" hangingPunct="1">
-                <a:lnSpc>
-                  <a:spcPct val="100000"/>
-                </a:lnSpc>
-                <a:spcBef>
-                  <a:spcPct val="50000"/>
-                </a:spcBef>
-                <a:spcAft>
-                  <a:spcPct val="0"/>
-                </a:spcAft>
-                <a:buClr>
-                  <a:srgbClr val="F0AB00"/>
-                </a:buClr>
-                <a:buSzPct val="80000"/>
-                <a:tabLst/>
-              </a:pPr>
-              <a:r>
-                <a:rPr kumimoji="0" lang="en-US" sz="1100" b="0" i="0" u="none" strike="noStrike" kern="0" cap="none" spc="0" normalizeH="0" baseline="0" dirty="0" err="1">
-                  <a:ln>
-                    <a:noFill/>
-                  </a:ln>
-                  <a:solidFill>
-                    <a:schemeClr val="bg1"/>
-                  </a:solidFill>
-                  <a:effectLst/>
-                  <a:uLnTx/>
-                  <a:uFillTx/>
-                  <a:ea typeface="Arial Unicode MS" pitchFamily="34" charset="-128"/>
-                  <a:cs typeface="Arial Unicode MS" pitchFamily="34" charset="-128"/>
-                </a:rPr>
-                <a:t>dockerd</a:t>
-              </a:r>
-              <a:endParaRPr kumimoji="0" lang="en-US" sz="1100" b="0" i="0" u="none" strike="noStrike" kern="0" cap="none" spc="0" normalizeH="0" baseline="0" dirty="0">
-                <a:ln>
-                  <a:noFill/>
-                </a:ln>
-                <a:solidFill>
-                  <a:schemeClr val="bg1"/>
-                </a:solidFill>
-                <a:effectLst/>
-                <a:uLnTx/>
-                <a:uFillTx/>
-                <a:ea typeface="Arial Unicode MS" pitchFamily="34" charset="-128"/>
-                <a:cs typeface="Arial Unicode MS" pitchFamily="34" charset="-128"/>
-              </a:endParaRPr>
-            </a:p>
-          </p:txBody>
-        </p:sp>
-      </p:grpSp>
-      <p:sp>
-        <p:nvSpPr>
-          <p:cNvPr id="12" name="Rectangle 11"/>
-          <p:cNvSpPr/>
-          <p:nvPr/>
-        </p:nvSpPr>
-        <p:spPr bwMode="gray">
-          <a:xfrm>
-            <a:off x="1889133" y="2421820"/>
-            <a:ext cx="774914" cy="668513"/>
-          </a:xfrm>
-          <a:prstGeom prst="rect">
-            <a:avLst/>
-          </a:prstGeom>
-          <a:solidFill>
-            <a:srgbClr val="F0AB00"/>
-          </a:solidFill>
-          <a:ln w="6350" algn="ctr">
-            <a:solidFill>
-              <a:schemeClr val="tx1"/>
-            </a:solidFill>
-            <a:miter lim="800000"/>
-            <a:headEnd/>
-            <a:tailEnd/>
-          </a:ln>
-        </p:spPr>
-        <p:txBody>
-          <a:bodyPr vert="horz" lIns="90000" tIns="72000" rIns="90000" bIns="72000" rtlCol="0" anchor="ctr"/>
-          <a:lstStyle/>
-          <a:p>
-            <a:pPr marR="0" algn="ctr" defTabSz="914400" eaLnBrk="1" fontAlgn="base" latinLnBrk="0" hangingPunct="1">
-              <a:lnSpc>
-                <a:spcPct val="100000"/>
-              </a:lnSpc>
-              <a:spcBef>
-                <a:spcPct val="50000"/>
-              </a:spcBef>
-              <a:spcAft>
-                <a:spcPct val="0"/>
-              </a:spcAft>
-              <a:buClr>
-                <a:srgbClr val="F0AB00"/>
-              </a:buClr>
-              <a:buSzPct val="80000"/>
-              <a:tabLst/>
-            </a:pPr>
-            <a:r>
-              <a:rPr kumimoji="0" lang="en-US" sz="1050" b="0" i="0" u="none" strike="noStrike" kern="0" cap="none" spc="0" normalizeH="0" baseline="0" dirty="0">
-                <a:ln>
-                  <a:noFill/>
-                </a:ln>
-                <a:solidFill>
-                  <a:schemeClr val="bg1"/>
-                </a:solidFill>
-                <a:effectLst/>
-                <a:uLnTx/>
-                <a:uFillTx/>
-                <a:ea typeface="Arial Unicode MS" pitchFamily="34" charset="-128"/>
-                <a:cs typeface="Arial Unicode MS" pitchFamily="34" charset="-128"/>
-              </a:rPr>
-              <a:t>Container</a:t>
-            </a:r>
-          </a:p>
-        </p:txBody>
-      </p:sp>
-      <p:sp>
-        <p:nvSpPr>
-          <p:cNvPr id="17" name="Rectangle 16"/>
-          <p:cNvSpPr/>
-          <p:nvPr/>
-        </p:nvSpPr>
-        <p:spPr bwMode="gray">
-          <a:xfrm>
-            <a:off x="994619" y="5250328"/>
-            <a:ext cx="4271648" cy="354606"/>
-          </a:xfrm>
-          <a:prstGeom prst="rect">
-            <a:avLst/>
-          </a:prstGeom>
-          <a:solidFill>
-            <a:schemeClr val="accent1">
-              <a:lumMod val="75000"/>
-            </a:schemeClr>
-          </a:solidFill>
-          <a:ln w="6350" algn="ctr">
-            <a:solidFill>
-              <a:schemeClr val="tx1"/>
-            </a:solidFill>
-            <a:miter lim="800000"/>
-            <a:headEnd/>
-            <a:tailEnd/>
-          </a:ln>
-        </p:spPr>
-        <p:txBody>
-          <a:bodyPr lIns="90000" tIns="72000" rIns="90000" bIns="72000" rtlCol="0" anchor="ctr"/>
-          <a:lstStyle/>
-          <a:p>
-            <a:pPr marR="0" algn="ctr" defTabSz="914400" eaLnBrk="1" fontAlgn="base" latinLnBrk="0" hangingPunct="1">
-              <a:lnSpc>
-                <a:spcPct val="100000"/>
-              </a:lnSpc>
-              <a:spcBef>
-                <a:spcPct val="50000"/>
-              </a:spcBef>
-              <a:spcAft>
-                <a:spcPct val="0"/>
-              </a:spcAft>
-              <a:buClr>
-                <a:srgbClr val="F0AB00"/>
-              </a:buClr>
-              <a:buSzPct val="80000"/>
-              <a:tabLst/>
-            </a:pPr>
-            <a:r>
-              <a:rPr kumimoji="0" lang="en-US" sz="1800" b="0" i="0" u="none" strike="noStrike" kern="0" cap="none" spc="0" normalizeH="0" baseline="0" dirty="0">
-                <a:ln>
-                  <a:noFill/>
-                </a:ln>
-                <a:solidFill>
-                  <a:schemeClr val="bg1"/>
-                </a:solidFill>
-                <a:effectLst/>
-                <a:uLnTx/>
-                <a:uFillTx/>
-                <a:ea typeface="Arial Unicode MS" pitchFamily="34" charset="-128"/>
-                <a:cs typeface="Arial Unicode MS" pitchFamily="34" charset="-128"/>
-              </a:rPr>
-              <a:t>Hardware</a:t>
-            </a:r>
-          </a:p>
-        </p:txBody>
-      </p:sp>
-      <p:sp>
-        <p:nvSpPr>
-          <p:cNvPr id="18" name="Rectangle 17"/>
-          <p:cNvSpPr/>
-          <p:nvPr/>
-        </p:nvSpPr>
-        <p:spPr bwMode="gray">
-          <a:xfrm>
-            <a:off x="4491353" y="2421820"/>
-            <a:ext cx="774914" cy="668513"/>
-          </a:xfrm>
-          <a:prstGeom prst="rect">
-            <a:avLst/>
-          </a:prstGeom>
-          <a:solidFill>
-            <a:srgbClr val="F0AB00"/>
-          </a:solidFill>
-          <a:ln w="6350" algn="ctr">
-            <a:solidFill>
-              <a:schemeClr val="tx1"/>
-            </a:solidFill>
-            <a:miter lim="800000"/>
-            <a:headEnd/>
-            <a:tailEnd/>
-          </a:ln>
-        </p:spPr>
-        <p:txBody>
-          <a:bodyPr vert="horz" lIns="90000" tIns="72000" rIns="90000" bIns="72000" rtlCol="0" anchor="ctr"/>
-          <a:lstStyle/>
-          <a:p>
-            <a:pPr marR="0" algn="ctr" defTabSz="914400" eaLnBrk="1" fontAlgn="base" latinLnBrk="0" hangingPunct="1">
-              <a:lnSpc>
-                <a:spcPct val="100000"/>
-              </a:lnSpc>
-              <a:spcBef>
-                <a:spcPct val="50000"/>
-              </a:spcBef>
-              <a:spcAft>
-                <a:spcPct val="0"/>
-              </a:spcAft>
-              <a:buClr>
-                <a:srgbClr val="F0AB00"/>
-              </a:buClr>
-              <a:buSzPct val="80000"/>
-              <a:tabLst/>
-            </a:pPr>
-            <a:r>
-              <a:rPr kumimoji="0" lang="en-US" sz="1050" b="0" i="0" u="none" strike="noStrike" kern="0" cap="none" spc="0" normalizeH="0" baseline="0" dirty="0">
-                <a:ln>
-                  <a:noFill/>
-                </a:ln>
-                <a:solidFill>
-                  <a:schemeClr val="bg1"/>
-                </a:solidFill>
-                <a:effectLst/>
-                <a:uLnTx/>
-                <a:uFillTx/>
-                <a:ea typeface="Arial Unicode MS" pitchFamily="34" charset="-128"/>
-                <a:cs typeface="Arial Unicode MS" pitchFamily="34" charset="-128"/>
-              </a:rPr>
-              <a:t>Container</a:t>
-            </a:r>
-          </a:p>
-        </p:txBody>
-      </p:sp>
-      <p:sp>
-        <p:nvSpPr>
-          <p:cNvPr id="20" name="Rectangle 19"/>
-          <p:cNvSpPr/>
-          <p:nvPr/>
-        </p:nvSpPr>
-        <p:spPr bwMode="gray">
-          <a:xfrm>
-            <a:off x="3618699" y="2421820"/>
-            <a:ext cx="774914" cy="668513"/>
-          </a:xfrm>
-          <a:prstGeom prst="rect">
-            <a:avLst/>
-          </a:prstGeom>
-          <a:solidFill>
-            <a:srgbClr val="F0AB00"/>
-          </a:solidFill>
-          <a:ln w="6350" algn="ctr">
-            <a:solidFill>
-              <a:schemeClr val="tx1"/>
-            </a:solidFill>
-            <a:miter lim="800000"/>
-            <a:headEnd/>
-            <a:tailEnd/>
-          </a:ln>
-        </p:spPr>
-        <p:txBody>
-          <a:bodyPr vert="horz" lIns="90000" tIns="72000" rIns="90000" bIns="72000" rtlCol="0" anchor="ctr"/>
-          <a:lstStyle/>
-          <a:p>
-            <a:pPr marR="0" algn="ctr" defTabSz="914400" eaLnBrk="1" fontAlgn="base" latinLnBrk="0" hangingPunct="1">
-              <a:lnSpc>
-                <a:spcPct val="100000"/>
-              </a:lnSpc>
-              <a:spcBef>
-                <a:spcPct val="50000"/>
-              </a:spcBef>
-              <a:spcAft>
-                <a:spcPct val="0"/>
-              </a:spcAft>
-              <a:buClr>
-                <a:srgbClr val="F0AB00"/>
-              </a:buClr>
-              <a:buSzPct val="80000"/>
-              <a:tabLst/>
-            </a:pPr>
-            <a:r>
-              <a:rPr kumimoji="0" lang="en-US" sz="1050" b="0" i="0" u="none" strike="noStrike" kern="0" cap="none" spc="0" normalizeH="0" baseline="0" dirty="0">
-                <a:ln>
-                  <a:noFill/>
-                </a:ln>
-                <a:solidFill>
-                  <a:schemeClr val="bg1"/>
-                </a:solidFill>
-                <a:effectLst/>
-                <a:uLnTx/>
-                <a:uFillTx/>
-                <a:ea typeface="Arial Unicode MS" pitchFamily="34" charset="-128"/>
-                <a:cs typeface="Arial Unicode MS" pitchFamily="34" charset="-128"/>
-              </a:rPr>
-              <a:t>Container</a:t>
-            </a:r>
-          </a:p>
-        </p:txBody>
-      </p:sp>
-      <p:sp>
-        <p:nvSpPr>
-          <p:cNvPr id="21" name="Rectangle 20"/>
-          <p:cNvSpPr/>
-          <p:nvPr/>
-        </p:nvSpPr>
-        <p:spPr bwMode="gray">
-          <a:xfrm>
-            <a:off x="2747779" y="2421820"/>
-            <a:ext cx="774914" cy="668513"/>
-          </a:xfrm>
-          <a:prstGeom prst="rect">
-            <a:avLst/>
-          </a:prstGeom>
-          <a:solidFill>
-            <a:srgbClr val="F0AB00"/>
-          </a:solidFill>
-          <a:ln w="6350" algn="ctr">
-            <a:solidFill>
-              <a:schemeClr val="tx1"/>
-            </a:solidFill>
-            <a:miter lim="800000"/>
-            <a:headEnd/>
-            <a:tailEnd/>
-          </a:ln>
-        </p:spPr>
-        <p:txBody>
-          <a:bodyPr vert="horz" lIns="90000" tIns="72000" rIns="90000" bIns="72000" rtlCol="0" anchor="ctr"/>
-          <a:lstStyle/>
-          <a:p>
-            <a:pPr marR="0" algn="ctr" defTabSz="914400" eaLnBrk="1" fontAlgn="base" latinLnBrk="0" hangingPunct="1">
-              <a:lnSpc>
-                <a:spcPct val="100000"/>
-              </a:lnSpc>
-              <a:spcBef>
-                <a:spcPct val="50000"/>
-              </a:spcBef>
-              <a:spcAft>
-                <a:spcPct val="0"/>
-              </a:spcAft>
-              <a:buClr>
-                <a:srgbClr val="F0AB00"/>
-              </a:buClr>
-              <a:buSzPct val="80000"/>
-              <a:tabLst/>
-            </a:pPr>
-            <a:r>
-              <a:rPr kumimoji="0" lang="en-US" sz="1050" b="0" i="0" u="none" strike="noStrike" kern="0" cap="none" spc="0" normalizeH="0" baseline="0" dirty="0">
-                <a:ln>
-                  <a:noFill/>
-                </a:ln>
-                <a:solidFill>
-                  <a:schemeClr val="bg1"/>
-                </a:solidFill>
-                <a:effectLst/>
-                <a:uLnTx/>
-                <a:uFillTx/>
-                <a:ea typeface="Arial Unicode MS" pitchFamily="34" charset="-128"/>
-                <a:cs typeface="Arial Unicode MS" pitchFamily="34" charset="-128"/>
-              </a:rPr>
-              <a:t>Container</a:t>
-            </a:r>
-          </a:p>
-        </p:txBody>
-      </p:sp>
-      <p:sp>
-        <p:nvSpPr>
-          <p:cNvPr id="22" name="Rectangle: Rounded Corners 21"/>
-          <p:cNvSpPr/>
-          <p:nvPr/>
-        </p:nvSpPr>
-        <p:spPr bwMode="gray">
-          <a:xfrm>
-            <a:off x="1232914" y="3885603"/>
-            <a:ext cx="1312438" cy="285950"/>
-          </a:xfrm>
-          <a:prstGeom prst="roundRect">
-            <a:avLst/>
-          </a:prstGeom>
-          <a:solidFill>
-            <a:schemeClr val="accent5">
-              <a:lumMod val="40000"/>
-              <a:lumOff val="60000"/>
-            </a:schemeClr>
-          </a:solidFill>
-          <a:ln w="6350" algn="ctr">
-            <a:solidFill>
-              <a:schemeClr val="tx1"/>
-            </a:solidFill>
-            <a:miter lim="800000"/>
-            <a:headEnd/>
-            <a:tailEnd/>
-          </a:ln>
-        </p:spPr>
-        <p:txBody>
-          <a:bodyPr lIns="90000" tIns="72000" rIns="90000" bIns="72000" rtlCol="0" anchor="ctr"/>
-          <a:lstStyle/>
-          <a:p>
-            <a:pPr marR="0" algn="ctr" defTabSz="914400" eaLnBrk="1" fontAlgn="base" latinLnBrk="0" hangingPunct="1">
-              <a:lnSpc>
-                <a:spcPct val="100000"/>
-              </a:lnSpc>
-              <a:spcBef>
-                <a:spcPct val="50000"/>
-              </a:spcBef>
-              <a:spcAft>
-                <a:spcPct val="0"/>
-              </a:spcAft>
-              <a:buClr>
-                <a:srgbClr val="F0AB00"/>
-              </a:buClr>
-              <a:buSzPct val="80000"/>
-              <a:tabLst/>
-            </a:pPr>
-            <a:r>
-              <a:rPr kumimoji="0" lang="en-US" sz="1400" b="0" i="0" u="none" strike="noStrike" kern="0" cap="none" spc="0" normalizeH="0" baseline="0" dirty="0">
-                <a:ln>
-                  <a:noFill/>
-                </a:ln>
-                <a:effectLst/>
-                <a:uLnTx/>
-                <a:uFillTx/>
-                <a:ea typeface="Arial Unicode MS" pitchFamily="34" charset="-128"/>
-                <a:cs typeface="Arial Unicode MS" pitchFamily="34" charset="-128"/>
-              </a:rPr>
-              <a:t>namespaces</a:t>
-            </a:r>
-          </a:p>
-        </p:txBody>
-      </p:sp>
-      <p:sp>
-        <p:nvSpPr>
-          <p:cNvPr id="23" name="Rectangle: Rounded Corners 22"/>
-          <p:cNvSpPr/>
-          <p:nvPr/>
-        </p:nvSpPr>
-        <p:spPr bwMode="gray">
-          <a:xfrm>
-            <a:off x="1079289" y="4314990"/>
-            <a:ext cx="1312438" cy="285950"/>
-          </a:xfrm>
-          <a:prstGeom prst="roundRect">
-            <a:avLst/>
-          </a:prstGeom>
-          <a:solidFill>
-            <a:schemeClr val="accent5">
-              <a:lumMod val="40000"/>
-              <a:lumOff val="60000"/>
-            </a:schemeClr>
-          </a:solidFill>
-          <a:ln w="6350" algn="ctr">
-            <a:solidFill>
-              <a:schemeClr val="tx1"/>
-            </a:solidFill>
-            <a:miter lim="800000"/>
-            <a:headEnd/>
-            <a:tailEnd/>
-          </a:ln>
-        </p:spPr>
-        <p:txBody>
-          <a:bodyPr lIns="90000" tIns="72000" rIns="90000" bIns="72000" rtlCol="0" anchor="ctr"/>
-          <a:lstStyle/>
-          <a:p>
-            <a:pPr marR="0" algn="ctr" defTabSz="914400" eaLnBrk="1" fontAlgn="base" latinLnBrk="0" hangingPunct="1">
-              <a:lnSpc>
-                <a:spcPct val="100000"/>
-              </a:lnSpc>
-              <a:spcBef>
-                <a:spcPct val="50000"/>
-              </a:spcBef>
-              <a:spcAft>
-                <a:spcPct val="0"/>
-              </a:spcAft>
-              <a:buClr>
-                <a:srgbClr val="F0AB00"/>
-              </a:buClr>
-              <a:buSzPct val="80000"/>
-              <a:tabLst/>
-            </a:pPr>
-            <a:r>
-              <a:rPr kumimoji="0" lang="en-US" sz="1400" b="0" i="0" u="none" strike="noStrike" kern="0" cap="none" spc="0" normalizeH="0" baseline="0" dirty="0" err="1">
-                <a:ln>
-                  <a:noFill/>
-                </a:ln>
-                <a:effectLst/>
-                <a:uLnTx/>
-                <a:uFillTx/>
-                <a:ea typeface="Arial Unicode MS" pitchFamily="34" charset="-128"/>
-                <a:cs typeface="Arial Unicode MS" pitchFamily="34" charset="-128"/>
-              </a:rPr>
-              <a:t>netfilter</a:t>
-            </a:r>
-            <a:endParaRPr kumimoji="0" lang="en-US" sz="1400" b="0" i="0" u="none" strike="noStrike" kern="0" cap="none" spc="0" normalizeH="0" baseline="0" dirty="0">
-              <a:ln>
-                <a:noFill/>
-              </a:ln>
-              <a:effectLst/>
-              <a:uLnTx/>
-              <a:uFillTx/>
-              <a:ea typeface="Arial Unicode MS" pitchFamily="34" charset="-128"/>
-              <a:cs typeface="Arial Unicode MS" pitchFamily="34" charset="-128"/>
-            </a:endParaRPr>
-          </a:p>
-        </p:txBody>
-      </p:sp>
-      <p:sp>
-        <p:nvSpPr>
-          <p:cNvPr id="25" name="Rectangle: Rounded Corners 24"/>
-          <p:cNvSpPr/>
-          <p:nvPr/>
-        </p:nvSpPr>
-        <p:spPr bwMode="gray">
-          <a:xfrm>
-            <a:off x="1658305" y="4780963"/>
-            <a:ext cx="1312438" cy="285950"/>
-          </a:xfrm>
-          <a:prstGeom prst="roundRect">
-            <a:avLst/>
-          </a:prstGeom>
-          <a:solidFill>
-            <a:schemeClr val="accent5">
-              <a:lumMod val="40000"/>
-              <a:lumOff val="60000"/>
-            </a:schemeClr>
-          </a:solidFill>
-          <a:ln w="6350" algn="ctr">
-            <a:solidFill>
-              <a:schemeClr val="tx1"/>
-            </a:solidFill>
-            <a:miter lim="800000"/>
-            <a:headEnd/>
-            <a:tailEnd/>
-          </a:ln>
-        </p:spPr>
-        <p:txBody>
-          <a:bodyPr lIns="90000" tIns="72000" rIns="90000" bIns="72000" rtlCol="0" anchor="ctr"/>
-          <a:lstStyle/>
-          <a:p>
-            <a:pPr marR="0" algn="ctr" defTabSz="914400" eaLnBrk="1" fontAlgn="base" latinLnBrk="0" hangingPunct="1">
-              <a:lnSpc>
-                <a:spcPct val="100000"/>
-              </a:lnSpc>
-              <a:spcBef>
-                <a:spcPct val="50000"/>
-              </a:spcBef>
-              <a:spcAft>
-                <a:spcPct val="0"/>
-              </a:spcAft>
-              <a:buClr>
-                <a:srgbClr val="F0AB00"/>
-              </a:buClr>
-              <a:buSzPct val="80000"/>
-              <a:tabLst/>
-            </a:pPr>
-            <a:r>
-              <a:rPr kumimoji="0" lang="en-US" sz="1400" b="0" i="0" u="none" strike="noStrike" kern="0" cap="none" spc="0" normalizeH="0" baseline="0" dirty="0" err="1">
-                <a:ln>
-                  <a:noFill/>
-                </a:ln>
-                <a:effectLst/>
-                <a:uLnTx/>
-                <a:uFillTx/>
-                <a:ea typeface="Arial Unicode MS" pitchFamily="34" charset="-128"/>
-                <a:cs typeface="Arial Unicode MS" pitchFamily="34" charset="-128"/>
-              </a:rPr>
-              <a:t>cgroups</a:t>
-            </a:r>
-            <a:endParaRPr kumimoji="0" lang="en-US" sz="1400" b="0" i="0" u="none" strike="noStrike" kern="0" cap="none" spc="0" normalizeH="0" baseline="0" dirty="0">
-              <a:ln>
-                <a:noFill/>
-              </a:ln>
-              <a:effectLst/>
-              <a:uLnTx/>
-              <a:uFillTx/>
-              <a:ea typeface="Arial Unicode MS" pitchFamily="34" charset="-128"/>
-              <a:cs typeface="Arial Unicode MS" pitchFamily="34" charset="-128"/>
-            </a:endParaRPr>
-          </a:p>
-        </p:txBody>
-      </p:sp>
-      <p:sp>
-        <p:nvSpPr>
-          <p:cNvPr id="27" name="Rectangle: Rounded Corners 26"/>
-          <p:cNvSpPr/>
-          <p:nvPr/>
-        </p:nvSpPr>
-        <p:spPr bwMode="gray">
-          <a:xfrm>
-            <a:off x="3737394" y="4310191"/>
-            <a:ext cx="1312438" cy="285950"/>
-          </a:xfrm>
-          <a:prstGeom prst="roundRect">
-            <a:avLst/>
-          </a:prstGeom>
-          <a:solidFill>
-            <a:schemeClr val="accent5">
-              <a:lumMod val="40000"/>
-              <a:lumOff val="60000"/>
-            </a:schemeClr>
-          </a:solidFill>
-          <a:ln w="6350" algn="ctr">
-            <a:solidFill>
-              <a:schemeClr val="tx1"/>
-            </a:solidFill>
-            <a:miter lim="800000"/>
-            <a:headEnd/>
-            <a:tailEnd/>
-          </a:ln>
-        </p:spPr>
-        <p:txBody>
-          <a:bodyPr lIns="90000" tIns="72000" rIns="90000" bIns="72000" rtlCol="0" anchor="ctr"/>
-          <a:lstStyle/>
-          <a:p>
-            <a:pPr marR="0" algn="ctr" defTabSz="914400" eaLnBrk="1" fontAlgn="base" latinLnBrk="0" hangingPunct="1">
-              <a:lnSpc>
-                <a:spcPct val="100000"/>
-              </a:lnSpc>
-              <a:spcBef>
-                <a:spcPct val="50000"/>
-              </a:spcBef>
-              <a:spcAft>
-                <a:spcPct val="0"/>
-              </a:spcAft>
-              <a:buClr>
-                <a:srgbClr val="F0AB00"/>
-              </a:buClr>
-              <a:buSzPct val="80000"/>
-              <a:tabLst/>
-            </a:pPr>
-            <a:r>
-              <a:rPr kumimoji="0" lang="en-US" sz="1400" b="0" i="0" u="none" strike="noStrike" kern="0" cap="none" spc="0" normalizeH="0" baseline="0" dirty="0">
-                <a:ln>
-                  <a:noFill/>
-                </a:ln>
-                <a:effectLst/>
-                <a:uLnTx/>
-                <a:uFillTx/>
-                <a:ea typeface="Arial Unicode MS" pitchFamily="34" charset="-128"/>
-                <a:cs typeface="Arial Unicode MS" pitchFamily="34" charset="-128"/>
-              </a:rPr>
-              <a:t>capabilities</a:t>
-            </a:r>
-          </a:p>
-        </p:txBody>
-      </p:sp>
-      <p:sp>
-        <p:nvSpPr>
-          <p:cNvPr id="28" name="Rectangle: Rounded Corners 27"/>
-          <p:cNvSpPr/>
-          <p:nvPr/>
-        </p:nvSpPr>
-        <p:spPr bwMode="gray">
-          <a:xfrm>
-            <a:off x="3817669" y="3823337"/>
-            <a:ext cx="1312438" cy="285950"/>
-          </a:xfrm>
-          <a:prstGeom prst="roundRect">
-            <a:avLst/>
-          </a:prstGeom>
-          <a:solidFill>
-            <a:schemeClr val="accent5">
-              <a:lumMod val="40000"/>
-              <a:lumOff val="60000"/>
-            </a:schemeClr>
-          </a:solidFill>
-          <a:ln w="6350" algn="ctr">
-            <a:solidFill>
-              <a:schemeClr val="tx1"/>
-            </a:solidFill>
-            <a:miter lim="800000"/>
-            <a:headEnd/>
-            <a:tailEnd/>
-          </a:ln>
-        </p:spPr>
-        <p:txBody>
-          <a:bodyPr lIns="90000" tIns="72000" rIns="90000" bIns="72000" rtlCol="0" anchor="ctr"/>
-          <a:lstStyle/>
-          <a:p>
-            <a:pPr marR="0" algn="ctr" defTabSz="914400" eaLnBrk="1" fontAlgn="base" latinLnBrk="0" hangingPunct="1">
-              <a:lnSpc>
-                <a:spcPct val="100000"/>
-              </a:lnSpc>
-              <a:spcBef>
-                <a:spcPct val="50000"/>
-              </a:spcBef>
-              <a:spcAft>
-                <a:spcPct val="0"/>
-              </a:spcAft>
-              <a:buClr>
-                <a:srgbClr val="F0AB00"/>
-              </a:buClr>
-              <a:buSzPct val="80000"/>
-              <a:tabLst/>
-            </a:pPr>
-            <a:r>
-              <a:rPr kumimoji="0" lang="en-US" sz="1400" b="0" i="0" u="none" strike="noStrike" kern="0" cap="none" spc="0" normalizeH="0" baseline="0" dirty="0" err="1">
-                <a:ln>
-                  <a:noFill/>
-                </a:ln>
-                <a:effectLst/>
-                <a:uLnTx/>
-                <a:uFillTx/>
-                <a:ea typeface="Arial Unicode MS" pitchFamily="34" charset="-128"/>
-                <a:cs typeface="Arial Unicode MS" pitchFamily="34" charset="-128"/>
-              </a:rPr>
-              <a:t>SELinux</a:t>
-            </a:r>
-            <a:endParaRPr kumimoji="0" lang="en-US" sz="1400" b="0" i="0" u="none" strike="noStrike" kern="0" cap="none" spc="0" normalizeH="0" baseline="0" dirty="0">
-              <a:ln>
-                <a:noFill/>
-              </a:ln>
-              <a:effectLst/>
-              <a:uLnTx/>
-              <a:uFillTx/>
-              <a:ea typeface="Arial Unicode MS" pitchFamily="34" charset="-128"/>
-              <a:cs typeface="Arial Unicode MS" pitchFamily="34" charset="-128"/>
-            </a:endParaRPr>
-          </a:p>
-        </p:txBody>
-      </p:sp>
-      <p:sp>
-        <p:nvSpPr>
-          <p:cNvPr id="29" name="Rectangle: Rounded Corners 28"/>
-          <p:cNvSpPr/>
-          <p:nvPr/>
-        </p:nvSpPr>
-        <p:spPr bwMode="gray">
-          <a:xfrm>
-            <a:off x="3436515" y="4780963"/>
-            <a:ext cx="1312438" cy="285950"/>
-          </a:xfrm>
-          <a:prstGeom prst="roundRect">
-            <a:avLst/>
-          </a:prstGeom>
-          <a:solidFill>
-            <a:schemeClr val="accent5">
-              <a:lumMod val="40000"/>
-              <a:lumOff val="60000"/>
-            </a:schemeClr>
-          </a:solidFill>
-          <a:ln w="6350" algn="ctr">
-            <a:solidFill>
-              <a:schemeClr val="tx1"/>
-            </a:solidFill>
-            <a:miter lim="800000"/>
-            <a:headEnd/>
-            <a:tailEnd/>
-          </a:ln>
-        </p:spPr>
-        <p:txBody>
-          <a:bodyPr lIns="90000" tIns="72000" rIns="90000" bIns="72000" rtlCol="0" anchor="ctr"/>
-          <a:lstStyle/>
-          <a:p>
-            <a:pPr marR="0" algn="ctr" defTabSz="914400" eaLnBrk="1" fontAlgn="base" latinLnBrk="0" hangingPunct="1">
-              <a:lnSpc>
-                <a:spcPct val="100000"/>
-              </a:lnSpc>
-              <a:spcBef>
-                <a:spcPct val="50000"/>
-              </a:spcBef>
-              <a:spcAft>
-                <a:spcPct val="0"/>
-              </a:spcAft>
-              <a:buClr>
-                <a:srgbClr val="F0AB00"/>
-              </a:buClr>
-              <a:buSzPct val="80000"/>
-              <a:tabLst/>
-            </a:pPr>
-            <a:r>
-              <a:rPr kumimoji="0" lang="en-US" sz="1400" b="0" i="0" u="none" strike="noStrike" kern="0" cap="none" spc="0" normalizeH="0" baseline="0" dirty="0" err="1">
-                <a:ln>
-                  <a:noFill/>
-                </a:ln>
-                <a:effectLst/>
-                <a:uLnTx/>
-                <a:uFillTx/>
-                <a:ea typeface="Arial Unicode MS" pitchFamily="34" charset="-128"/>
-                <a:cs typeface="Arial Unicode MS" pitchFamily="34" charset="-128"/>
-              </a:rPr>
-              <a:t>AppArmor</a:t>
-            </a:r>
-            <a:endParaRPr kumimoji="0" lang="en-US" sz="1400" b="0" i="0" u="none" strike="noStrike" kern="0" cap="none" spc="0" normalizeH="0" baseline="0" dirty="0">
-              <a:ln>
-                <a:noFill/>
-              </a:ln>
-              <a:effectLst/>
-              <a:uLnTx/>
-              <a:uFillTx/>
-              <a:ea typeface="Arial Unicode MS" pitchFamily="34" charset="-128"/>
-              <a:cs typeface="Arial Unicode MS" pitchFamily="34" charset="-128"/>
-            </a:endParaRPr>
-          </a:p>
-        </p:txBody>
-      </p:sp>
-      <p:sp>
-        <p:nvSpPr>
-          <p:cNvPr id="31" name="Rectangle: Rounded Corners 30"/>
-          <p:cNvSpPr/>
-          <p:nvPr/>
-        </p:nvSpPr>
-        <p:spPr bwMode="gray">
-          <a:xfrm>
-            <a:off x="2681625" y="4047333"/>
-            <a:ext cx="937074" cy="285950"/>
-          </a:xfrm>
-          <a:prstGeom prst="roundRect">
-            <a:avLst/>
-          </a:prstGeom>
-          <a:solidFill>
-            <a:schemeClr val="accent5">
-              <a:lumMod val="40000"/>
-              <a:lumOff val="60000"/>
-            </a:schemeClr>
-          </a:solidFill>
-          <a:ln w="6350" algn="ctr">
-            <a:solidFill>
-              <a:schemeClr val="tx1"/>
-            </a:solidFill>
-            <a:miter lim="800000"/>
-            <a:headEnd/>
-            <a:tailEnd/>
-          </a:ln>
-        </p:spPr>
-        <p:txBody>
-          <a:bodyPr lIns="90000" tIns="72000" rIns="90000" bIns="72000" rtlCol="0" anchor="ctr"/>
-          <a:lstStyle/>
-          <a:p>
-            <a:pPr marR="0" algn="ctr" defTabSz="914400" eaLnBrk="1" fontAlgn="base" latinLnBrk="0" hangingPunct="1">
-              <a:lnSpc>
-                <a:spcPct val="100000"/>
-              </a:lnSpc>
-              <a:spcBef>
-                <a:spcPct val="50000"/>
-              </a:spcBef>
-              <a:spcAft>
-                <a:spcPct val="0"/>
-              </a:spcAft>
-              <a:buClr>
-                <a:srgbClr val="F0AB00"/>
-              </a:buClr>
-              <a:buSzPct val="80000"/>
-              <a:tabLst/>
-            </a:pPr>
-            <a:r>
-              <a:rPr kumimoji="0" lang="en-US" sz="1400" b="0" i="0" u="none" strike="noStrike" kern="0" cap="none" spc="0" normalizeH="0" baseline="0" dirty="0" err="1">
-                <a:ln>
-                  <a:noFill/>
-                </a:ln>
-                <a:effectLst/>
-                <a:uLnTx/>
-                <a:uFillTx/>
-                <a:ea typeface="Arial Unicode MS" pitchFamily="34" charset="-128"/>
-                <a:cs typeface="Arial Unicode MS" pitchFamily="34" charset="-128"/>
-              </a:rPr>
-              <a:t>Netlink</a:t>
-            </a:r>
-            <a:endParaRPr kumimoji="0" lang="en-US" sz="1400" b="0" i="0" u="none" strike="noStrike" kern="0" cap="none" spc="0" normalizeH="0" baseline="0" dirty="0">
-              <a:ln>
-                <a:noFill/>
-              </a:ln>
-              <a:effectLst/>
-              <a:uLnTx/>
-              <a:uFillTx/>
-              <a:ea typeface="Arial Unicode MS" pitchFamily="34" charset="-128"/>
-              <a:cs typeface="Arial Unicode MS" pitchFamily="34" charset="-128"/>
-            </a:endParaRPr>
-          </a:p>
-        </p:txBody>
-      </p:sp>
-      <p:sp>
-        <p:nvSpPr>
-          <p:cNvPr id="32" name="Text Placeholder 10"/>
-          <p:cNvSpPr txBox="1">
-            <a:spLocks/>
-          </p:cNvSpPr>
-          <p:nvPr/>
-        </p:nvSpPr>
-        <p:spPr bwMode="gray">
-          <a:xfrm>
-            <a:off x="6203454" y="1620000"/>
-            <a:ext cx="5487021" cy="4707648"/>
-          </a:xfrm>
-          <a:prstGeom prst="rect">
-            <a:avLst/>
-          </a:prstGeom>
-        </p:spPr>
-        <p:txBody>
-          <a:bodyPr vert="horz" lIns="0" tIns="0" rIns="0" bIns="0" rtlCol="0">
-            <a:noAutofit/>
-          </a:bodyPr>
-          <a:lstStyle>
-            <a:lvl1pPr marL="0" indent="0" algn="l" defTabSz="1088558" rtl="0" eaLnBrk="1" latinLnBrk="0" hangingPunct="1">
-              <a:spcBef>
-                <a:spcPts val="1800"/>
-              </a:spcBef>
-              <a:buClr>
-                <a:schemeClr val="accent1"/>
-              </a:buClr>
-              <a:buSzPct val="80000"/>
-              <a:buFontTx/>
-              <a:buNone/>
-              <a:defRPr sz="2000" b="0" kern="1200">
-                <a:solidFill>
-                  <a:schemeClr val="tx1"/>
-                </a:solidFill>
-                <a:latin typeface="+mn-lt"/>
-                <a:ea typeface="+mn-ea"/>
-                <a:cs typeface="+mn-cs"/>
-              </a:defRPr>
-            </a:lvl1pPr>
-            <a:lvl2pPr marL="179964" indent="-179964" algn="l" defTabSz="1088558" rtl="0" eaLnBrk="1" latinLnBrk="0" hangingPunct="1">
-              <a:spcBef>
-                <a:spcPts val="600"/>
-              </a:spcBef>
-              <a:buClr>
-                <a:schemeClr val="accent1"/>
-              </a:buClr>
-              <a:buSzPct val="100000"/>
-              <a:buFont typeface="Wingdings" pitchFamily="2" charset="2"/>
-              <a:buChar char="§"/>
-              <a:defRPr sz="1800" kern="1200">
-                <a:solidFill>
-                  <a:schemeClr val="tx1"/>
-                </a:solidFill>
-                <a:latin typeface="+mn-lt"/>
-                <a:ea typeface="+mn-ea"/>
-                <a:cs typeface="+mn-cs"/>
-              </a:defRPr>
-            </a:lvl2pPr>
-            <a:lvl3pPr marL="358775" indent="-179388" algn="l" defTabSz="1088558" rtl="0" eaLnBrk="1" latinLnBrk="0" hangingPunct="1">
-              <a:spcBef>
-                <a:spcPts val="300"/>
-              </a:spcBef>
-              <a:buClr>
-                <a:schemeClr val="tx1"/>
-              </a:buClr>
-              <a:buSzPct val="100000"/>
-              <a:buFont typeface="Arial" panose="020B0604020202020204" pitchFamily="34" charset="0"/>
-              <a:buChar char="–"/>
-              <a:defRPr lang="en-US" sz="1800" kern="1200" noProof="0" dirty="0" smtClean="0">
-                <a:solidFill>
-                  <a:schemeClr val="tx1"/>
-                </a:solidFill>
-                <a:latin typeface="+mn-lt"/>
-                <a:ea typeface="+mn-ea"/>
-                <a:cs typeface="+mn-cs"/>
-              </a:defRPr>
-            </a:lvl3pPr>
-            <a:lvl4pPr marL="539892" indent="-179964" algn="l" defTabSz="1088558" rtl="0" eaLnBrk="1" latinLnBrk="0" hangingPunct="1">
-              <a:spcBef>
-                <a:spcPts val="300"/>
-              </a:spcBef>
-              <a:buClr>
-                <a:schemeClr val="tx1"/>
-              </a:buClr>
-              <a:buSzPct val="120000"/>
-              <a:buFont typeface="Arial" pitchFamily="34" charset="0"/>
-              <a:buChar char="▫"/>
-              <a:defRPr sz="1600" kern="1200">
-                <a:solidFill>
-                  <a:schemeClr val="tx1"/>
-                </a:solidFill>
-                <a:latin typeface="+mn-lt"/>
-                <a:ea typeface="+mn-ea"/>
-                <a:cs typeface="+mn-cs"/>
-              </a:defRPr>
-            </a:lvl4pPr>
-            <a:lvl5pPr marL="719856" indent="-179964" algn="l" defTabSz="1088558" rtl="0" eaLnBrk="1" latinLnBrk="0" hangingPunct="1">
-              <a:spcBef>
-                <a:spcPts val="100"/>
-              </a:spcBef>
-              <a:buClr>
-                <a:schemeClr val="tx1"/>
-              </a:buClr>
-              <a:buSzPct val="100000"/>
-              <a:buFont typeface="Symbol" panose="05050102010706020507" pitchFamily="18" charset="2"/>
-              <a:buChar char="-"/>
-              <a:defRPr sz="1400" kern="1200" baseline="0">
-                <a:solidFill>
-                  <a:schemeClr val="tx1"/>
-                </a:solidFill>
-                <a:latin typeface="+mn-lt"/>
-                <a:ea typeface="+mn-ea"/>
-                <a:cs typeface="+mn-cs"/>
-              </a:defRPr>
-            </a:lvl5pPr>
-            <a:lvl6pPr marL="2993535" indent="-272140" algn="l" defTabSz="1088558" rtl="0" eaLnBrk="1" latinLnBrk="0" hangingPunct="1">
-              <a:spcBef>
-                <a:spcPct val="20000"/>
-              </a:spcBef>
-              <a:buFont typeface="Arial" pitchFamily="34" charset="0"/>
-              <a:buChar char="•"/>
-              <a:defRPr sz="2400" kern="1200">
-                <a:solidFill>
-                  <a:schemeClr val="tx1"/>
-                </a:solidFill>
-                <a:latin typeface="+mn-lt"/>
-                <a:ea typeface="+mn-ea"/>
-                <a:cs typeface="+mn-cs"/>
-              </a:defRPr>
-            </a:lvl6pPr>
-            <a:lvl7pPr marL="3537814" indent="-272140" algn="l" defTabSz="1088558" rtl="0" eaLnBrk="1" latinLnBrk="0" hangingPunct="1">
-              <a:spcBef>
-                <a:spcPct val="20000"/>
-              </a:spcBef>
-              <a:buFont typeface="Arial" pitchFamily="34" charset="0"/>
-              <a:buChar char="•"/>
-              <a:defRPr sz="2400" kern="1200">
-                <a:solidFill>
-                  <a:schemeClr val="tx1"/>
-                </a:solidFill>
-                <a:latin typeface="+mn-lt"/>
-                <a:ea typeface="+mn-ea"/>
-                <a:cs typeface="+mn-cs"/>
-              </a:defRPr>
-            </a:lvl7pPr>
-            <a:lvl8pPr marL="4082093" indent="-272140" algn="l" defTabSz="1088558" rtl="0" eaLnBrk="1" latinLnBrk="0" hangingPunct="1">
-              <a:spcBef>
-                <a:spcPct val="20000"/>
-              </a:spcBef>
-              <a:buFont typeface="Arial" pitchFamily="34" charset="0"/>
-              <a:buChar char="•"/>
-              <a:defRPr sz="2400" kern="1200">
-                <a:solidFill>
-                  <a:schemeClr val="tx1"/>
-                </a:solidFill>
-                <a:latin typeface="+mn-lt"/>
-                <a:ea typeface="+mn-ea"/>
-                <a:cs typeface="+mn-cs"/>
-              </a:defRPr>
-            </a:lvl8pPr>
-            <a:lvl9pPr marL="4626373" indent="-272140" algn="l" defTabSz="1088558" rtl="0" eaLnBrk="1" latinLnBrk="0" hangingPunct="1">
-              <a:spcBef>
-                <a:spcPct val="20000"/>
-              </a:spcBef>
-              <a:buFont typeface="Arial" pitchFamily="34" charset="0"/>
-              <a:buChar char="•"/>
-              <a:defRPr sz="2400" kern="1200">
-                <a:solidFill>
-                  <a:schemeClr val="tx1"/>
-                </a:solidFill>
-                <a:latin typeface="+mn-lt"/>
-                <a:ea typeface="+mn-ea"/>
-                <a:cs typeface="+mn-cs"/>
-              </a:defRPr>
-            </a:lvl9pPr>
-          </a:lstStyle>
-          <a:p>
-            <a:r>
-              <a:rPr lang="en-US" sz="1600" dirty="0"/>
-              <a:t>Namespaces</a:t>
-            </a:r>
-          </a:p>
-          <a:p>
-            <a:pPr lvl="1"/>
-            <a:r>
-              <a:rPr lang="en-US" sz="1400" dirty="0"/>
-              <a:t>Isolation of resources per process</a:t>
-            </a:r>
-          </a:p>
-          <a:p>
-            <a:pPr lvl="1"/>
-            <a:r>
-              <a:rPr lang="en-US" sz="1400" dirty="0"/>
-              <a:t>7 different namespaces</a:t>
-            </a:r>
-          </a:p>
-          <a:p>
-            <a:r>
-              <a:rPr lang="en-US" sz="1600" dirty="0" err="1"/>
-              <a:t>netfilter</a:t>
-            </a:r>
-            <a:endParaRPr lang="en-US" sz="1600" dirty="0"/>
-          </a:p>
-          <a:p>
-            <a:pPr lvl="1"/>
-            <a:r>
-              <a:rPr lang="en-US" sz="1400" dirty="0"/>
-              <a:t>Firewall and packet manipulation</a:t>
-            </a:r>
-          </a:p>
-          <a:p>
-            <a:r>
-              <a:rPr lang="en-US" sz="1600" dirty="0" err="1"/>
-              <a:t>cgroups</a:t>
-            </a:r>
-            <a:endParaRPr lang="en-US" sz="1600" dirty="0"/>
-          </a:p>
-          <a:p>
-            <a:pPr lvl="1"/>
-            <a:r>
-              <a:rPr lang="en-US" sz="1400" dirty="0"/>
-              <a:t>Manage resource allocation</a:t>
-            </a:r>
-          </a:p>
-          <a:p>
-            <a:r>
-              <a:rPr lang="en-US" sz="1600" dirty="0" err="1"/>
-              <a:t>Netlink</a:t>
-            </a:r>
-            <a:endParaRPr lang="en-US" sz="1600" dirty="0"/>
-          </a:p>
-          <a:p>
-            <a:pPr lvl="1"/>
-            <a:r>
-              <a:rPr lang="en-US" sz="1400" dirty="0" err="1"/>
-              <a:t>Interprocess</a:t>
-            </a:r>
-            <a:r>
-              <a:rPr lang="en-US" sz="1400" dirty="0"/>
-              <a:t> communication between containers</a:t>
-            </a:r>
-          </a:p>
-          <a:p>
-            <a:r>
-              <a:rPr lang="en-US" sz="1600" dirty="0" err="1"/>
-              <a:t>SELinux</a:t>
-            </a:r>
-            <a:r>
-              <a:rPr lang="en-US" sz="1600" dirty="0"/>
-              <a:t>/</a:t>
-            </a:r>
-            <a:r>
-              <a:rPr lang="en-US" sz="1600" dirty="0" err="1"/>
-              <a:t>AppArmor</a:t>
-            </a:r>
-            <a:r>
-              <a:rPr lang="en-US" sz="1600" dirty="0"/>
-              <a:t>/</a:t>
-            </a:r>
-            <a:r>
-              <a:rPr lang="en-US" sz="1600" dirty="0" err="1"/>
-              <a:t>Seccomp</a:t>
-            </a:r>
-            <a:endParaRPr lang="en-US" sz="1600" dirty="0"/>
-          </a:p>
-          <a:p>
-            <a:pPr lvl="1"/>
-            <a:r>
-              <a:rPr lang="en-US" sz="1400" dirty="0"/>
-              <a:t>Security profiles to govern access to resources</a:t>
-            </a:r>
-          </a:p>
-          <a:p>
-            <a:r>
-              <a:rPr lang="en-US" sz="1600" dirty="0"/>
-              <a:t>capabilities</a:t>
-            </a:r>
-          </a:p>
-          <a:p>
-            <a:pPr lvl="1"/>
-            <a:r>
-              <a:rPr lang="en-US" sz="1400" dirty="0"/>
-              <a:t>Granular control of privileges</a:t>
-            </a:r>
-          </a:p>
-        </p:txBody>
-      </p:sp>
-    </p:spTree>
-    <p:extLst>
-      <p:ext uri="{BB962C8B-B14F-4D97-AF65-F5344CB8AC3E}">
-        <p14:creationId xmlns:p14="http://schemas.microsoft.com/office/powerpoint/2010/main" val="2524894991"/>
-      </p:ext>
-    </p:extLst>
-  </p:cSld>
-  <p:clrMapOvr>
-    <a:masterClrMapping/>
-  </p:clrMapOvr>
-</p:sld>
-</file>
-
-<file path=ppt/slides/slide7.xml><?xml version="1.0" encoding="utf-8"?>
-<p:sld xmlns:a="http://schemas.openxmlformats.org/drawingml/2006/main" xmlns:r="http://schemas.openxmlformats.org/officeDocument/2006/relationships" xmlns:p="http://schemas.openxmlformats.org/presentationml/2006/main">
-  <p:cSld>
-    <p:spTree>
-      <p:nvGrpSpPr>
-        <p:cNvPr id="1" name=""/>
-        <p:cNvGrpSpPr/>
-        <p:nvPr/>
-      </p:nvGrpSpPr>
-      <p:grpSpPr>
-        <a:xfrm>
-          <a:off x="0" y="0"/>
-          <a:ext cx="0" cy="0"/>
-          <a:chOff x="0" y="0"/>
-          <a:chExt cx="0" cy="0"/>
-        </a:xfrm>
-      </p:grpSpPr>
-      <p:sp>
-        <p:nvSpPr>
           <p:cNvPr id="11" name="Text Placeholder 10"/>
           <p:cNvSpPr>
             <a:spLocks noGrp="1"/>
@@ -14778,32 +13014,14 @@
             <a:pPr lvl="1"/>
             <a:r>
               <a:rPr lang="en-US" dirty="0"/>
-              <a:t>LXC</a:t>
+              <a:t>LXC / LXD</a:t>
             </a:r>
           </a:p>
           <a:p>
             <a:pPr lvl="2"/>
             <a:r>
               <a:rPr lang="en-US" dirty="0"/>
-              <a:t>VM Containers in Linux kernel, since 2008</a:t>
-            </a:r>
-          </a:p>
-          <a:p>
-            <a:pPr lvl="2"/>
-            <a:endParaRPr lang="en-US" dirty="0"/>
-          </a:p>
-          <a:p>
-            <a:pPr lvl="1"/>
-            <a:r>
-              <a:rPr lang="en-US" dirty="0"/>
-              <a:t>LXD</a:t>
-            </a:r>
-          </a:p>
-          <a:p>
-            <a:pPr lvl="2"/>
-            <a:r>
-              <a:rPr lang="en-US" dirty="0"/>
-              <a:t>Extension of LCX by Ubuntu, adds a controlling daemon</a:t>
+              <a:t>VM Containers in Linux kernel eventually enhanced by Ubuntu</a:t>
             </a:r>
           </a:p>
           <a:p>
@@ -14881,6 +13099,24 @@
             <a:r>
               <a:rPr lang="en-US" dirty="0"/>
               <a:t>Container engine by CoreOS to replace Docker</a:t>
+            </a:r>
+          </a:p>
+          <a:p>
+            <a:pPr lvl="2"/>
+            <a:endParaRPr lang="en-US" dirty="0"/>
+          </a:p>
+          <a:p>
+            <a:pPr lvl="1"/>
+            <a:r>
+              <a:rPr lang="en-US" dirty="0"/>
+              <a:t>cri-o</a:t>
+            </a:r>
+          </a:p>
+          <a:p>
+            <a:pPr lvl="2"/>
+            <a:r>
+              <a:rPr lang="en-US" dirty="0"/>
+              <a:t>New lightweight container runtime to implements Kubernetes' container runtime interface</a:t>
             </a:r>
           </a:p>
           <a:p>
@@ -14941,8 +13177,8 @@
         </p:blipFill>
         <p:spPr>
           <a:xfrm>
-            <a:off x="10015068" y="1924807"/>
-            <a:ext cx="1311717" cy="1311717"/>
+            <a:off x="10193692" y="1228616"/>
+            <a:ext cx="1133091" cy="1133091"/>
           </a:xfrm>
           <a:prstGeom prst="rect">
             <a:avLst/>
@@ -14965,8 +13201,8 @@
         </p:blipFill>
         <p:spPr>
           <a:xfrm>
-            <a:off x="6916226" y="1413582"/>
-            <a:ext cx="2896569" cy="1559691"/>
+            <a:off x="7221682" y="1413582"/>
+            <a:ext cx="2591113" cy="1395215"/>
           </a:xfrm>
           <a:prstGeom prst="rect">
             <a:avLst/>
@@ -14989,8 +13225,8 @@
         </p:blipFill>
         <p:spPr>
           <a:xfrm>
-            <a:off x="10015068" y="4508768"/>
-            <a:ext cx="1098793" cy="1458146"/>
+            <a:off x="10193692" y="3751963"/>
+            <a:ext cx="985275" cy="1307503"/>
           </a:xfrm>
           <a:prstGeom prst="rect">
             <a:avLst/>
@@ -15015,8 +13251,44 @@
         </p:blipFill>
         <p:spPr>
           <a:xfrm>
-            <a:off x="7912608" y="3236524"/>
-            <a:ext cx="1957785" cy="1166190"/>
+            <a:off x="7726845" y="3062502"/>
+            <a:ext cx="1871249" cy="1114643"/>
+          </a:xfrm>
+          <a:prstGeom prst="rect">
+            <a:avLst/>
+          </a:prstGeom>
+        </p:spPr>
+      </p:pic>
+      <p:pic>
+        <p:nvPicPr>
+          <p:cNvPr id="6" name="Graphic 5">
+            <a:extLst>
+              <a:ext uri="{FF2B5EF4-FFF2-40B4-BE49-F238E27FC236}">
+                <a16:creationId xmlns:a16="http://schemas.microsoft.com/office/drawing/2014/main" id="{D12855FE-64D3-44B4-BD51-F4A430177811}"/>
+              </a:ext>
+            </a:extLst>
+          </p:cNvPr>
+          <p:cNvPicPr>
+            <a:picLocks noChangeAspect="1"/>
+          </p:cNvPicPr>
+          <p:nvPr/>
+        </p:nvPicPr>
+        <p:blipFill>
+          <a:blip r:embed="rId7">
+            <a:extLst>
+              <a:ext uri="{96DAC541-7B7A-43D3-8B79-37D633B846F1}">
+                <asvg:svgBlip xmlns:asvg="http://schemas.microsoft.com/office/drawing/2016/SVG/main" r:embed="rId8"/>
+              </a:ext>
+            </a:extLst>
+          </a:blip>
+          <a:stretch>
+            <a:fillRect/>
+          </a:stretch>
+        </p:blipFill>
+        <p:spPr>
+          <a:xfrm>
+            <a:off x="7467422" y="4957870"/>
+            <a:ext cx="2345373" cy="892130"/>
           </a:xfrm>
           <a:prstGeom prst="rect">
             <a:avLst/>
@@ -15036,7 +13308,7 @@
 </p:sld>
 </file>
 
-<file path=ppt/slides/slide8.xml><?xml version="1.0" encoding="utf-8"?>
+<file path=ppt/slides/slide7.xml><?xml version="1.0" encoding="utf-8"?>
 <p:sld xmlns:a="http://schemas.openxmlformats.org/drawingml/2006/main" xmlns:r="http://schemas.openxmlformats.org/officeDocument/2006/relationships" xmlns:p="http://schemas.openxmlformats.org/presentationml/2006/main" show="0">
   <p:cSld>
     <p:spTree>

</xml_diff>

<commit_message>
#189 how to stop & continue demo script execution
</commit_message>
<xml_diff>
--- a/docker/01_Basics_of_containers.pptx
+++ b/docker/01_Basics_of_containers.pptx
@@ -832,8 +832,21 @@
           <a:p>
             <a:r>
               <a:rPr lang="en-US" b="0" dirty="0"/>
-              <a:t>The script will demonstrate how cgroups can be used to control processes. The example is focusing on CPU usage.</a:t>
-            </a:r>
+              <a:t>The script will demonstrate how cgroups can be used to control processes. The example is focusing on CPU usage. </a:t>
+            </a:r>
+            <a:r>
+              <a:rPr lang="en-US" sz="1400" b="0" i="0" kern="1200" dirty="0">
+                <a:solidFill>
+                  <a:schemeClr val="tx1"/>
+                </a:solidFill>
+                <a:effectLst/>
+                <a:latin typeface="+mn-lt"/>
+                <a:ea typeface="+mn-ea"/>
+                <a:cs typeface="+mn-cs"/>
+              </a:rPr>
+              <a:t>Script execution can be stopped with "ctrl + s" and continued with "ctrl + q“.</a:t>
+            </a:r>
+            <a:endParaRPr lang="en-US" b="0" dirty="0"/>
           </a:p>
           <a:p>
             <a:endParaRPr lang="en-US" b="0" dirty="0"/>
@@ -1100,8 +1113,33 @@
             </a:r>
             <a:r>
               <a:rPr lang="en-US" b="0" dirty="0"/>
-              <a:t>. To make things easier, this demo  is based on Docker so it might give already an impression on how Docker works.</a:t>
-            </a:r>
+              <a:t>. To make things easier, this demo  is based on Docker so it might give already an impression on how Docker works. S</a:t>
+            </a:r>
+            <a:r>
+              <a:rPr lang="en-US" sz="1400" b="0" i="0" kern="1200" dirty="0">
+                <a:solidFill>
+                  <a:schemeClr val="tx1"/>
+                </a:solidFill>
+                <a:effectLst/>
+                <a:latin typeface="+mn-lt"/>
+                <a:ea typeface="+mn-ea"/>
+                <a:cs typeface="+mn-cs"/>
+              </a:rPr>
+              <a:t>cript execution can be stopped with "ctrl + s" and continued with "ctrl </a:t>
+            </a:r>
+            <a:r>
+              <a:rPr lang="en-US" sz="1400" b="0" i="0" kern="1200">
+                <a:solidFill>
+                  <a:schemeClr val="tx1"/>
+                </a:solidFill>
+                <a:effectLst/>
+                <a:latin typeface="+mn-lt"/>
+                <a:ea typeface="+mn-ea"/>
+                <a:cs typeface="+mn-cs"/>
+              </a:rPr>
+              <a:t>+ q“.</a:t>
+            </a:r>
+            <a:endParaRPr lang="en-US" b="0" dirty="0"/>
           </a:p>
           <a:p>
             <a:endParaRPr lang="en-US" b="0" dirty="0"/>
@@ -1950,8 +1988,21 @@
           <a:p>
             <a:r>
               <a:rPr lang="en-US" dirty="0"/>
-              <a:t>The script will do the setup of a minimal environment (basically only a bash + libs) and chroot into it.</a:t>
-            </a:r>
+              <a:t>The script will do the setup of a minimal environment (basically only a bash + libs) and chroot into it. </a:t>
+            </a:r>
+            <a:r>
+              <a:rPr lang="en-US" sz="1400" b="0" i="0" kern="1200" dirty="0">
+                <a:solidFill>
+                  <a:schemeClr val="tx1"/>
+                </a:solidFill>
+                <a:effectLst/>
+                <a:latin typeface="+mn-lt"/>
+                <a:ea typeface="+mn-ea"/>
+                <a:cs typeface="+mn-cs"/>
+              </a:rPr>
+              <a:t>Script execution can be stopped with "ctrl + s" and continued with "ctrl + q“.</a:t>
+            </a:r>
+            <a:endParaRPr lang="en-US" dirty="0"/>
           </a:p>
           <a:p>
             <a:endParaRPr lang="en-US" dirty="0"/>
@@ -2390,8 +2441,21 @@
             </a:r>
             <a:r>
               <a:rPr lang="en-US" b="0" dirty="0"/>
-              <a:t>.</a:t>
-            </a:r>
+              <a:t>. </a:t>
+            </a:r>
+            <a:r>
+              <a:rPr lang="en-US" sz="1400" b="0" i="0" kern="1200" dirty="0">
+                <a:solidFill>
+                  <a:schemeClr val="tx1"/>
+                </a:solidFill>
+                <a:effectLst/>
+                <a:latin typeface="+mn-lt"/>
+                <a:ea typeface="+mn-ea"/>
+                <a:cs typeface="+mn-cs"/>
+              </a:rPr>
+              <a:t>Script execution can be stopped with "ctrl + s" and continued with "ctrl + q“.</a:t>
+            </a:r>
+            <a:endParaRPr lang="en-US" b="0" dirty="0"/>
           </a:p>
           <a:p>
             <a:endParaRPr lang="en-US" b="0" dirty="0"/>

</xml_diff>

<commit_message>
More Koopa (and better colors).
</commit_message>
<xml_diff>
--- a/docker/01_Basics_of_containers.pptx
+++ b/docker/01_Basics_of_containers.pptx
@@ -14325,76 +14325,6 @@
       </p:pic>
       <p:sp>
         <p:nvSpPr>
-          <p:cNvPr id="17" name="Rectangle: Rounded Corners 16">
-            <a:extLst>
-              <a:ext uri="{FF2B5EF4-FFF2-40B4-BE49-F238E27FC236}">
-                <a16:creationId xmlns:a16="http://schemas.microsoft.com/office/drawing/2014/main" id="{3ABE47BC-35ED-4E9A-8B4E-A9B750CA52F5}"/>
-              </a:ext>
-            </a:extLst>
-          </p:cNvPr>
-          <p:cNvSpPr/>
-          <p:nvPr/>
-        </p:nvSpPr>
-        <p:spPr bwMode="gray">
-          <a:xfrm>
-            <a:off x="619126" y="1724025"/>
-            <a:ext cx="4572000" cy="619125"/>
-          </a:xfrm>
-          <a:prstGeom prst="roundRect">
-            <a:avLst>
-              <a:gd name="adj" fmla="val 50000"/>
-            </a:avLst>
-          </a:prstGeom>
-          <a:solidFill>
-            <a:schemeClr val="accent1"/>
-          </a:solidFill>
-          <a:ln w="6350" algn="ctr">
-            <a:solidFill>
-              <a:schemeClr val="tx1"/>
-            </a:solidFill>
-            <a:miter lim="800000"/>
-            <a:headEnd/>
-            <a:tailEnd/>
-          </a:ln>
-        </p:spPr>
-        <p:txBody>
-          <a:bodyPr lIns="90000" tIns="72000" rIns="90000" bIns="72000" rtlCol="0" anchor="ctr"/>
-          <a:lstStyle/>
-          <a:p>
-            <a:pPr marR="0" algn="ctr" defTabSz="914400" eaLnBrk="1" fontAlgn="base" latinLnBrk="0" hangingPunct="1">
-              <a:lnSpc>
-                <a:spcPct val="100000"/>
-              </a:lnSpc>
-              <a:spcBef>
-                <a:spcPct val="50000"/>
-              </a:spcBef>
-              <a:spcAft>
-                <a:spcPct val="0"/>
-              </a:spcAft>
-              <a:buClr>
-                <a:srgbClr val="F0AB00"/>
-              </a:buClr>
-              <a:buSzPct val="80000"/>
-              <a:tabLst/>
-            </a:pPr>
-            <a:r>
-              <a:rPr kumimoji="0" lang="en-US" sz="1800" b="1" i="0" u="none" strike="noStrike" kern="0" cap="none" spc="0" normalizeH="0" baseline="0" noProof="0" dirty="0">
-                <a:ln>
-                  <a:noFill/>
-                </a:ln>
-                <a:effectLst/>
-                <a:uLnTx/>
-                <a:uFillTx/>
-                <a:ea typeface="Arial Unicode MS" pitchFamily="34" charset="-128"/>
-                <a:cs typeface="Arial Unicode MS" pitchFamily="34" charset="-128"/>
-              </a:rPr>
-              <a:t>Application</a:t>
-            </a:r>
-          </a:p>
-        </p:txBody>
-      </p:sp>
-      <p:sp>
-        <p:nvSpPr>
           <p:cNvPr id="19" name="Text Placeholder 58">
             <a:extLst>
               <a:ext uri="{FF2B5EF4-FFF2-40B4-BE49-F238E27FC236}">
@@ -14843,6 +14773,76 @@
                 <a:cs typeface="Courier New" panose="02070309020205020404" pitchFamily="49" charset="0"/>
               </a:rPr>
               <a:t>reboot</a:t>
+            </a:r>
+          </a:p>
+        </p:txBody>
+      </p:sp>
+      <p:sp>
+        <p:nvSpPr>
+          <p:cNvPr id="17" name="Rectangle: Rounded Corners 16">
+            <a:extLst>
+              <a:ext uri="{FF2B5EF4-FFF2-40B4-BE49-F238E27FC236}">
+                <a16:creationId xmlns:a16="http://schemas.microsoft.com/office/drawing/2014/main" id="{3ABE47BC-35ED-4E9A-8B4E-A9B750CA52F5}"/>
+              </a:ext>
+            </a:extLst>
+          </p:cNvPr>
+          <p:cNvSpPr/>
+          <p:nvPr/>
+        </p:nvSpPr>
+        <p:spPr bwMode="gray">
+          <a:xfrm>
+            <a:off x="619126" y="1724025"/>
+            <a:ext cx="4572000" cy="619125"/>
+          </a:xfrm>
+          <a:prstGeom prst="roundRect">
+            <a:avLst>
+              <a:gd name="adj" fmla="val 50000"/>
+            </a:avLst>
+          </a:prstGeom>
+          <a:solidFill>
+            <a:schemeClr val="accent1"/>
+          </a:solidFill>
+          <a:ln w="6350" algn="ctr">
+            <a:solidFill>
+              <a:schemeClr val="tx1"/>
+            </a:solidFill>
+            <a:miter lim="800000"/>
+            <a:headEnd/>
+            <a:tailEnd/>
+          </a:ln>
+        </p:spPr>
+        <p:txBody>
+          <a:bodyPr lIns="90000" tIns="72000" rIns="90000" bIns="72000" rtlCol="0" anchor="ctr"/>
+          <a:lstStyle/>
+          <a:p>
+            <a:pPr marR="0" algn="ctr" defTabSz="914400" eaLnBrk="1" fontAlgn="base" latinLnBrk="0" hangingPunct="1">
+              <a:lnSpc>
+                <a:spcPct val="100000"/>
+              </a:lnSpc>
+              <a:spcBef>
+                <a:spcPct val="50000"/>
+              </a:spcBef>
+              <a:spcAft>
+                <a:spcPct val="0"/>
+              </a:spcAft>
+              <a:buClr>
+                <a:srgbClr val="F0AB00"/>
+              </a:buClr>
+              <a:buSzPct val="80000"/>
+              <a:tabLst/>
+            </a:pPr>
+            <a:r>
+              <a:rPr kumimoji="0" lang="en-US" sz="1800" b="1" i="0" u="none" strike="noStrike" kern="0" cap="none" spc="0" normalizeH="0" baseline="0" noProof="0" dirty="0">
+                <a:ln>
+                  <a:noFill/>
+                </a:ln>
+                <a:effectLst/>
+                <a:uLnTx/>
+                <a:uFillTx/>
+                <a:ea typeface="Arial Unicode MS" pitchFamily="34" charset="-128"/>
+                <a:cs typeface="Arial Unicode MS" pitchFamily="34" charset="-128"/>
+              </a:rPr>
+              <a:t>Application</a:t>
             </a:r>
           </a:p>
         </p:txBody>
@@ -21176,6 +21176,21 @@
 </file>
 
 <file path=customXml/item1.xml><?xml version="1.0" encoding="utf-8"?>
+<?mso-contentType ?>
+<FormTemplates xmlns="http://schemas.microsoft.com/sharepoint/v3/contenttype/forms">
+  <Display>DocumentLibraryForm</Display>
+  <Edit>DocumentLibraryForm</Edit>
+  <New>DocumentLibraryForm</New>
+</FormTemplates>
+</file>
+
+<file path=customXml/item2.xml><?xml version="1.0" encoding="utf-8"?>
+<p:properties xmlns:p="http://schemas.microsoft.com/office/2006/metadata/properties" xmlns:xsi="http://www.w3.org/2001/XMLSchema-instance" xmlns:pc="http://schemas.microsoft.com/office/infopath/2007/PartnerControls">
+  <documentManagement/>
+</p:properties>
+</file>
+
+<file path=customXml/item3.xml><?xml version="1.0" encoding="utf-8"?>
 <ct:contentTypeSchema xmlns:ct="http://schemas.microsoft.com/office/2006/metadata/contentType" xmlns:ma="http://schemas.microsoft.com/office/2006/metadata/properties/metaAttributes" ct:_="" ma:_="" ma:contentTypeName="Document" ma:contentTypeID="0x0101000983C563634F704D94CF761DBC03EA5F" ma:contentTypeVersion="4" ma:contentTypeDescription="Create a new document." ma:contentTypeScope="" ma:versionID="e67c02ceee4b342f82f59e2cf148f083">
   <xsd:schema xmlns:xsd="http://www.w3.org/2001/XMLSchema" xmlns:xs="http://www.w3.org/2001/XMLSchema" xmlns:p="http://schemas.microsoft.com/office/2006/metadata/properties" xmlns:ns2="a87f7151-1b36-4597-84cf-4d71535204ce" xmlns:ns3="9a5af304-f682-4bdf-b883-32d674d6b4c0" targetNamespace="http://schemas.microsoft.com/office/2006/metadata/properties" ma:root="true" ma:fieldsID="6780043507351d7647e04fb5ca2e6c73" ns2:_="" ns3:_="">
     <xsd:import namespace="a87f7151-1b36-4597-84cf-4d71535204ce"/>
@@ -21340,22 +21355,24 @@
 </ct:contentTypeSchema>
 </file>
 
-<file path=customXml/item2.xml><?xml version="1.0" encoding="utf-8"?>
-<p:properties xmlns:p="http://schemas.microsoft.com/office/2006/metadata/properties" xmlns:xsi="http://www.w3.org/2001/XMLSchema-instance" xmlns:pc="http://schemas.microsoft.com/office/infopath/2007/PartnerControls">
-  <documentManagement/>
-</p:properties>
+<file path=customXml/itemProps1.xml><?xml version="1.0" encoding="utf-8"?>
+<ds:datastoreItem xmlns:ds="http://schemas.openxmlformats.org/officeDocument/2006/customXml" ds:itemID="{770DE74E-E788-4B7B-8551-430ADD5F5AF1}">
+  <ds:schemaRefs>
+    <ds:schemaRef ds:uri="http://schemas.microsoft.com/sharepoint/v3/contenttype/forms"/>
+  </ds:schemaRefs>
+</ds:datastoreItem>
 </file>
 
-<file path=customXml/item3.xml><?xml version="1.0" encoding="utf-8"?>
-<?mso-contentType ?>
-<FormTemplates xmlns="http://schemas.microsoft.com/sharepoint/v3/contenttype/forms">
-  <Display>DocumentLibraryForm</Display>
-  <Edit>DocumentLibraryForm</Edit>
-  <New>DocumentLibraryForm</New>
-</FormTemplates>
+<file path=customXml/itemProps2.xml><?xml version="1.0" encoding="utf-8"?>
+<ds:datastoreItem xmlns:ds="http://schemas.openxmlformats.org/officeDocument/2006/customXml" ds:itemID="{217406A4-AEB7-4645-B093-8758CB486CA4}">
+  <ds:schemaRefs>
+    <ds:schemaRef ds:uri="http://schemas.microsoft.com/office/2006/metadata/properties"/>
+    <ds:schemaRef ds:uri="http://schemas.microsoft.com/office/infopath/2007/PartnerControls"/>
+  </ds:schemaRefs>
+</ds:datastoreItem>
 </file>
 
-<file path=customXml/itemProps1.xml><?xml version="1.0" encoding="utf-8"?>
+<file path=customXml/itemProps3.xml><?xml version="1.0" encoding="utf-8"?>
 <ds:datastoreItem xmlns:ds="http://schemas.openxmlformats.org/officeDocument/2006/customXml" ds:itemID="{48D604B4-A050-47DE-9CC8-2612EC3271AE}">
   <ds:schemaRefs>
     <ds:schemaRef ds:uri="http://schemas.microsoft.com/office/2006/metadata/contentType"/>
@@ -21372,21 +21389,4 @@
     <ds:schemaRef ds:uri="http://schemas.microsoft.com/internal/obd"/>
   </ds:schemaRefs>
 </ds:datastoreItem>
-</file>
-
-<file path=customXml/itemProps2.xml><?xml version="1.0" encoding="utf-8"?>
-<ds:datastoreItem xmlns:ds="http://schemas.openxmlformats.org/officeDocument/2006/customXml" ds:itemID="{217406A4-AEB7-4645-B093-8758CB486CA4}">
-  <ds:schemaRefs>
-    <ds:schemaRef ds:uri="http://schemas.microsoft.com/office/2006/metadata/properties"/>
-    <ds:schemaRef ds:uri="http://schemas.microsoft.com/office/infopath/2007/PartnerControls"/>
-  </ds:schemaRefs>
-</ds:datastoreItem>
-</file>
-
-<file path=customXml/itemProps3.xml><?xml version="1.0" encoding="utf-8"?>
-<ds:datastoreItem xmlns:ds="http://schemas.openxmlformats.org/officeDocument/2006/customXml" ds:itemID="{770DE74E-E788-4B7B-8551-430ADD5F5AF1}">
-  <ds:schemaRefs>
-    <ds:schemaRef ds:uri="http://schemas.microsoft.com/sharepoint/v3/contenttype/forms"/>
-  </ds:schemaRefs>
-</ds:datastoreItem>
 </file>
</xml_diff>